<commit_message>
v2.00.00 Student data from '21 removed, starting on creation of '22 course
</commit_message>
<xml_diff>
--- a/w1_getting_started/w1_getting_started.pptx
+++ b/w1_getting_started/w1_getting_started.pptx
@@ -217,13 +217,972 @@
 <file path=ppt/revisionInfo.xml><?xml version="1.0" encoding="utf-8"?>
 <p1510:revInfo xmlns:a="http://schemas.openxmlformats.org/drawingml/2006/main" xmlns:r="http://schemas.openxmlformats.org/officeDocument/2006/relationships" xmlns:p1510="http://schemas.microsoft.com/office/powerpoint/2015/10/main">
   <p1510:revLst>
-    <p1510:client id="{EEEC5C09-B039-45E0-BFBC-F8CC3B3AADD8}" v="340" dt="2021-09-27T06:21:49.895"/>
+    <p1510:client id="{B4247C41-06B2-4F78-B774-55EDA9C86B32}" v="2" dt="2022-06-02T09:47:33.034"/>
   </p1510:revLst>
 </p1510:revInfo>
 </file>
 
 <file path=ppt/changesInfos/changesInfo1.xml><?xml version="1.0" encoding="utf-8"?>
 <pc:chgInfo xmlns:a="http://schemas.openxmlformats.org/drawingml/2006/main" xmlns:r="http://schemas.openxmlformats.org/officeDocument/2006/relationships" xmlns:ac="http://schemas.microsoft.com/office/drawing/2013/main/command" xmlns:pc="http://schemas.microsoft.com/office/powerpoint/2013/main/command">
+  <pc:docChgLst>
+    <pc:chgData name="Peter McGinty" userId="138e04b35f3df159" providerId="LiveId" clId="{58769E37-A9B1-4E9A-ADE9-11F898BA6085}"/>
+    <pc:docChg chg="undo custSel addSld delSld modSld sldOrd modMainMaster addSection delSection modSection">
+      <pc:chgData name="Peter McGinty" userId="138e04b35f3df159" providerId="LiveId" clId="{58769E37-A9B1-4E9A-ADE9-11F898BA6085}" dt="2021-08-16T23:08:20.909" v="2049" actId="20577"/>
+      <pc:docMkLst>
+        <pc:docMk/>
+      </pc:docMkLst>
+      <pc:sldChg chg="addSp delSp modSp add mod modClrScheme chgLayout">
+        <pc:chgData name="Peter McGinty" userId="138e04b35f3df159" providerId="LiveId" clId="{58769E37-A9B1-4E9A-ADE9-11F898BA6085}" dt="2021-08-15T22:39:40.929" v="475" actId="20577"/>
+        <pc:sldMkLst>
+          <pc:docMk/>
+          <pc:sldMk cId="3743528606" sldId="256"/>
+        </pc:sldMkLst>
+        <pc:spChg chg="mod ord">
+          <ac:chgData name="Peter McGinty" userId="138e04b35f3df159" providerId="LiveId" clId="{58769E37-A9B1-4E9A-ADE9-11F898BA6085}" dt="2021-08-15T22:12:12.743" v="407" actId="700"/>
+          <ac:spMkLst>
+            <pc:docMk/>
+            <pc:sldMk cId="3743528606" sldId="256"/>
+            <ac:spMk id="2" creationId="{02FEE16B-71B8-43A1-BC00-7A908FE032E6}"/>
+          </ac:spMkLst>
+        </pc:spChg>
+        <pc:spChg chg="del mod ord">
+          <ac:chgData name="Peter McGinty" userId="138e04b35f3df159" providerId="LiveId" clId="{58769E37-A9B1-4E9A-ADE9-11F898BA6085}" dt="2021-08-15T22:12:12.743" v="407" actId="700"/>
+          <ac:spMkLst>
+            <pc:docMk/>
+            <pc:sldMk cId="3743528606" sldId="256"/>
+            <ac:spMk id="3" creationId="{B6C64D23-63A6-4F9E-8173-27ECF12FF6DD}"/>
+          </ac:spMkLst>
+        </pc:spChg>
+        <pc:spChg chg="add mod ord">
+          <ac:chgData name="Peter McGinty" userId="138e04b35f3df159" providerId="LiveId" clId="{58769E37-A9B1-4E9A-ADE9-11F898BA6085}" dt="2021-08-15T22:39:40.929" v="475" actId="20577"/>
+          <ac:spMkLst>
+            <pc:docMk/>
+            <pc:sldMk cId="3743528606" sldId="256"/>
+            <ac:spMk id="4" creationId="{C0DDB592-654E-448B-8AC2-092C2701D126}"/>
+          </ac:spMkLst>
+        </pc:spChg>
+      </pc:sldChg>
+      <pc:sldChg chg="addSp delSp modSp add mod modClrScheme chgLayout">
+        <pc:chgData name="Peter McGinty" userId="138e04b35f3df159" providerId="LiveId" clId="{58769E37-A9B1-4E9A-ADE9-11F898BA6085}" dt="2021-08-16T14:44:53.082" v="1537" actId="20577"/>
+        <pc:sldMkLst>
+          <pc:docMk/>
+          <pc:sldMk cId="697685717" sldId="257"/>
+        </pc:sldMkLst>
+        <pc:spChg chg="mod ord">
+          <ac:chgData name="Peter McGinty" userId="138e04b35f3df159" providerId="LiveId" clId="{58769E37-A9B1-4E9A-ADE9-11F898BA6085}" dt="2021-08-16T14:44:53.082" v="1537" actId="20577"/>
+          <ac:spMkLst>
+            <pc:docMk/>
+            <pc:sldMk cId="697685717" sldId="257"/>
+            <ac:spMk id="2" creationId="{28932AB5-BD43-4ADD-BD4D-A5FC99A6C59D}"/>
+          </ac:spMkLst>
+        </pc:spChg>
+        <pc:spChg chg="del mod ord">
+          <ac:chgData name="Peter McGinty" userId="138e04b35f3df159" providerId="LiveId" clId="{58769E37-A9B1-4E9A-ADE9-11F898BA6085}" dt="2021-08-15T22:39:17.256" v="439" actId="700"/>
+          <ac:spMkLst>
+            <pc:docMk/>
+            <pc:sldMk cId="697685717" sldId="257"/>
+            <ac:spMk id="3" creationId="{E46D7266-05CF-4C8B-AE05-490F2ED66CDE}"/>
+          </ac:spMkLst>
+        </pc:spChg>
+        <pc:spChg chg="add mod ord">
+          <ac:chgData name="Peter McGinty" userId="138e04b35f3df159" providerId="LiveId" clId="{58769E37-A9B1-4E9A-ADE9-11F898BA6085}" dt="2021-08-15T23:36:38.415" v="1198" actId="20577"/>
+          <ac:spMkLst>
+            <pc:docMk/>
+            <pc:sldMk cId="697685717" sldId="257"/>
+            <ac:spMk id="4" creationId="{1E31C777-EF67-48C4-815B-E932275CFDA6}"/>
+          </ac:spMkLst>
+        </pc:spChg>
+      </pc:sldChg>
+      <pc:sldChg chg="addSp delSp modSp add mod">
+        <pc:chgData name="Peter McGinty" userId="138e04b35f3df159" providerId="LiveId" clId="{58769E37-A9B1-4E9A-ADE9-11F898BA6085}" dt="2021-08-16T23:07:42.887" v="2031" actId="478"/>
+        <pc:sldMkLst>
+          <pc:docMk/>
+          <pc:sldMk cId="1152165044" sldId="258"/>
+        </pc:sldMkLst>
+        <pc:spChg chg="mod">
+          <ac:chgData name="Peter McGinty" userId="138e04b35f3df159" providerId="LiveId" clId="{58769E37-A9B1-4E9A-ADE9-11F898BA6085}" dt="2021-08-15T21:52:39.929" v="7" actId="20577"/>
+          <ac:spMkLst>
+            <pc:docMk/>
+            <pc:sldMk cId="1152165044" sldId="258"/>
+            <ac:spMk id="2" creationId="{8E184D61-12EB-4E24-8458-B11B38FAA072}"/>
+          </ac:spMkLst>
+        </pc:spChg>
+        <pc:spChg chg="mod">
+          <ac:chgData name="Peter McGinty" userId="138e04b35f3df159" providerId="LiveId" clId="{58769E37-A9B1-4E9A-ADE9-11F898BA6085}" dt="2021-08-16T22:58:11.906" v="2018" actId="20577"/>
+          <ac:spMkLst>
+            <pc:docMk/>
+            <pc:sldMk cId="1152165044" sldId="258"/>
+            <ac:spMk id="3" creationId="{6F3FF9D2-DA03-438D-8DAD-3180335EB864}"/>
+          </ac:spMkLst>
+        </pc:spChg>
+        <pc:picChg chg="add del mod">
+          <ac:chgData name="Peter McGinty" userId="138e04b35f3df159" providerId="LiveId" clId="{58769E37-A9B1-4E9A-ADE9-11F898BA6085}" dt="2021-08-16T23:07:42.887" v="2031" actId="478"/>
+          <ac:picMkLst>
+            <pc:docMk/>
+            <pc:sldMk cId="1152165044" sldId="258"/>
+            <ac:picMk id="4" creationId="{0422AF40-A508-4616-B75B-7484C55B27DA}"/>
+          </ac:picMkLst>
+        </pc:picChg>
+        <pc:picChg chg="add mod">
+          <ac:chgData name="Peter McGinty" userId="138e04b35f3df159" providerId="LiveId" clId="{58769E37-A9B1-4E9A-ADE9-11F898BA6085}" dt="2021-08-16T23:07:41.337" v="2029" actId="1076"/>
+          <ac:picMkLst>
+            <pc:docMk/>
+            <pc:sldMk cId="1152165044" sldId="258"/>
+            <ac:picMk id="5" creationId="{92FFFDDB-DFBB-41AF-AB20-9D91CAB121C1}"/>
+          </ac:picMkLst>
+        </pc:picChg>
+        <pc:picChg chg="add del mod">
+          <ac:chgData name="Peter McGinty" userId="138e04b35f3df159" providerId="LiveId" clId="{58769E37-A9B1-4E9A-ADE9-11F898BA6085}" dt="2021-08-16T23:07:36.973" v="2028" actId="478"/>
+          <ac:picMkLst>
+            <pc:docMk/>
+            <pc:sldMk cId="1152165044" sldId="258"/>
+            <ac:picMk id="6" creationId="{C7703BC3-ED7E-493C-AD32-FDE18C8F7978}"/>
+          </ac:picMkLst>
+        </pc:picChg>
+      </pc:sldChg>
+      <pc:sldChg chg="addSp modSp add mod modClrScheme modAnim chgLayout">
+        <pc:chgData name="Peter McGinty" userId="138e04b35f3df159" providerId="LiveId" clId="{58769E37-A9B1-4E9A-ADE9-11F898BA6085}" dt="2021-08-16T22:56:15.318" v="2001" actId="21"/>
+        <pc:sldMkLst>
+          <pc:docMk/>
+          <pc:sldMk cId="2418505398" sldId="259"/>
+        </pc:sldMkLst>
+        <pc:spChg chg="mod ord">
+          <ac:chgData name="Peter McGinty" userId="138e04b35f3df159" providerId="LiveId" clId="{58769E37-A9B1-4E9A-ADE9-11F898BA6085}" dt="2021-08-15T22:04:37.245" v="358" actId="700"/>
+          <ac:spMkLst>
+            <pc:docMk/>
+            <pc:sldMk cId="2418505398" sldId="259"/>
+            <ac:spMk id="2" creationId="{A79306C3-5AF3-47CE-BD27-C2B769C26101}"/>
+          </ac:spMkLst>
+        </pc:spChg>
+        <pc:spChg chg="mod ord">
+          <ac:chgData name="Peter McGinty" userId="138e04b35f3df159" providerId="LiveId" clId="{58769E37-A9B1-4E9A-ADE9-11F898BA6085}" dt="2021-08-16T22:56:02.518" v="1999" actId="27636"/>
+          <ac:spMkLst>
+            <pc:docMk/>
+            <pc:sldMk cId="2418505398" sldId="259"/>
+            <ac:spMk id="3" creationId="{E4BF0B8F-A6C2-4140-A654-4A1CEEF2E8FB}"/>
+          </ac:spMkLst>
+        </pc:spChg>
+        <pc:spChg chg="add mod ord">
+          <ac:chgData name="Peter McGinty" userId="138e04b35f3df159" providerId="LiveId" clId="{58769E37-A9B1-4E9A-ADE9-11F898BA6085}" dt="2021-08-16T22:56:15.318" v="2001" actId="21"/>
+          <ac:spMkLst>
+            <pc:docMk/>
+            <pc:sldMk cId="2418505398" sldId="259"/>
+            <ac:spMk id="4" creationId="{57075649-FADE-4755-BEF1-1370FB40D005}"/>
+          </ac:spMkLst>
+        </pc:spChg>
+      </pc:sldChg>
+      <pc:sldChg chg="addSp delSp modSp add mod modClrScheme chgLayout">
+        <pc:chgData name="Peter McGinty" userId="138e04b35f3df159" providerId="LiveId" clId="{58769E37-A9B1-4E9A-ADE9-11F898BA6085}" dt="2021-08-16T23:08:20.909" v="2049" actId="20577"/>
+        <pc:sldMkLst>
+          <pc:docMk/>
+          <pc:sldMk cId="3652514884" sldId="260"/>
+        </pc:sldMkLst>
+        <pc:spChg chg="mod ord">
+          <ac:chgData name="Peter McGinty" userId="138e04b35f3df159" providerId="LiveId" clId="{58769E37-A9B1-4E9A-ADE9-11F898BA6085}" dt="2021-08-16T15:07:14.421" v="1858" actId="700"/>
+          <ac:spMkLst>
+            <pc:docMk/>
+            <pc:sldMk cId="3652514884" sldId="260"/>
+            <ac:spMk id="2" creationId="{F72245F1-A625-4B21-B541-2F3ADA5C2588}"/>
+          </ac:spMkLst>
+        </pc:spChg>
+        <pc:spChg chg="del mod ord">
+          <ac:chgData name="Peter McGinty" userId="138e04b35f3df159" providerId="LiveId" clId="{58769E37-A9B1-4E9A-ADE9-11F898BA6085}" dt="2021-08-16T15:02:54.906" v="1848" actId="478"/>
+          <ac:spMkLst>
+            <pc:docMk/>
+            <pc:sldMk cId="3652514884" sldId="260"/>
+            <ac:spMk id="3" creationId="{F1F94A89-B7A1-4C2E-AEF7-DE9C9068B11B}"/>
+          </ac:spMkLst>
+        </pc:spChg>
+        <pc:spChg chg="add mod ord">
+          <ac:chgData name="Peter McGinty" userId="138e04b35f3df159" providerId="LiveId" clId="{58769E37-A9B1-4E9A-ADE9-11F898BA6085}" dt="2021-08-16T15:07:43.471" v="1863"/>
+          <ac:spMkLst>
+            <pc:docMk/>
+            <pc:sldMk cId="3652514884" sldId="260"/>
+            <ac:spMk id="4" creationId="{84E7AE25-ED64-4986-B2D8-91404B900FE1}"/>
+          </ac:spMkLst>
+        </pc:spChg>
+        <pc:spChg chg="add del mod ord">
+          <ac:chgData name="Peter McGinty" userId="138e04b35f3df159" providerId="LiveId" clId="{58769E37-A9B1-4E9A-ADE9-11F898BA6085}" dt="2021-08-16T15:02:52.040" v="1847" actId="478"/>
+          <ac:spMkLst>
+            <pc:docMk/>
+            <pc:sldMk cId="3652514884" sldId="260"/>
+            <ac:spMk id="5" creationId="{AEEED897-D5C2-4F17-98BC-077B835352B4}"/>
+          </ac:spMkLst>
+        </pc:spChg>
+        <pc:spChg chg="add del mod ord">
+          <ac:chgData name="Peter McGinty" userId="138e04b35f3df159" providerId="LiveId" clId="{58769E37-A9B1-4E9A-ADE9-11F898BA6085}" dt="2021-08-16T15:02:28.203" v="1825" actId="700"/>
+          <ac:spMkLst>
+            <pc:docMk/>
+            <pc:sldMk cId="3652514884" sldId="260"/>
+            <ac:spMk id="6" creationId="{85009A62-A695-4A52-AC24-9134B299F4E3}"/>
+          </ac:spMkLst>
+        </pc:spChg>
+        <pc:spChg chg="add del mod">
+          <ac:chgData name="Peter McGinty" userId="138e04b35f3df159" providerId="LiveId" clId="{58769E37-A9B1-4E9A-ADE9-11F898BA6085}" dt="2021-08-16T15:02:57.952" v="1849" actId="478"/>
+          <ac:spMkLst>
+            <pc:docMk/>
+            <pc:sldMk cId="3652514884" sldId="260"/>
+            <ac:spMk id="10" creationId="{7138F621-3D14-44DC-B53B-348CD2C347F8}"/>
+          </ac:spMkLst>
+        </pc:spChg>
+        <pc:spChg chg="add del mod">
+          <ac:chgData name="Peter McGinty" userId="138e04b35f3df159" providerId="LiveId" clId="{58769E37-A9B1-4E9A-ADE9-11F898BA6085}" dt="2021-08-16T15:07:10.802" v="1857" actId="6264"/>
+          <ac:spMkLst>
+            <pc:docMk/>
+            <pc:sldMk cId="3652514884" sldId="260"/>
+            <ac:spMk id="11" creationId="{62BE7FED-4C93-466F-8A1A-E605367A36CC}"/>
+          </ac:spMkLst>
+        </pc:spChg>
+        <pc:spChg chg="add del mod">
+          <ac:chgData name="Peter McGinty" userId="138e04b35f3df159" providerId="LiveId" clId="{58769E37-A9B1-4E9A-ADE9-11F898BA6085}" dt="2021-08-16T15:07:10.802" v="1857" actId="6264"/>
+          <ac:spMkLst>
+            <pc:docMk/>
+            <pc:sldMk cId="3652514884" sldId="260"/>
+            <ac:spMk id="12" creationId="{B409A966-B0D4-4A62-B11B-D4C0A96E1D5D}"/>
+          </ac:spMkLst>
+        </pc:spChg>
+        <pc:spChg chg="add del mod ord">
+          <ac:chgData name="Peter McGinty" userId="138e04b35f3df159" providerId="LiveId" clId="{58769E37-A9B1-4E9A-ADE9-11F898BA6085}" dt="2021-08-16T15:07:14.421" v="1858" actId="700"/>
+          <ac:spMkLst>
+            <pc:docMk/>
+            <pc:sldMk cId="3652514884" sldId="260"/>
+            <ac:spMk id="13" creationId="{6EBE4623-FD2E-4358-8291-9F24EDF8192B}"/>
+          </ac:spMkLst>
+        </pc:spChg>
+        <pc:spChg chg="add mod ord">
+          <ac:chgData name="Peter McGinty" userId="138e04b35f3df159" providerId="LiveId" clId="{58769E37-A9B1-4E9A-ADE9-11F898BA6085}" dt="2021-08-16T15:07:29.846" v="1861" actId="20578"/>
+          <ac:spMkLst>
+            <pc:docMk/>
+            <pc:sldMk cId="3652514884" sldId="260"/>
+            <ac:spMk id="14" creationId="{4050B917-0B2A-4336-A0D1-5B1EDEAAE6E2}"/>
+          </ac:spMkLst>
+        </pc:spChg>
+        <pc:spChg chg="add mod ord">
+          <ac:chgData name="Peter McGinty" userId="138e04b35f3df159" providerId="LiveId" clId="{58769E37-A9B1-4E9A-ADE9-11F898BA6085}" dt="2021-08-16T23:08:20.909" v="2049" actId="20577"/>
+          <ac:spMkLst>
+            <pc:docMk/>
+            <pc:sldMk cId="3652514884" sldId="260"/>
+            <ac:spMk id="15" creationId="{EE87C03F-AED1-40F9-AFE2-A926E147DB4D}"/>
+          </ac:spMkLst>
+        </pc:spChg>
+        <pc:spChg chg="add mod ord">
+          <ac:chgData name="Peter McGinty" userId="138e04b35f3df159" providerId="LiveId" clId="{58769E37-A9B1-4E9A-ADE9-11F898BA6085}" dt="2021-08-16T15:07:50.520" v="1865"/>
+          <ac:spMkLst>
+            <pc:docMk/>
+            <pc:sldMk cId="3652514884" sldId="260"/>
+            <ac:spMk id="16" creationId="{B36D811B-FA72-454D-907A-880F48144E9B}"/>
+          </ac:spMkLst>
+        </pc:spChg>
+        <pc:picChg chg="add del mod">
+          <ac:chgData name="Peter McGinty" userId="138e04b35f3df159" providerId="LiveId" clId="{58769E37-A9B1-4E9A-ADE9-11F898BA6085}" dt="2021-08-16T15:07:05.192" v="1856" actId="478"/>
+          <ac:picMkLst>
+            <pc:docMk/>
+            <pc:sldMk cId="3652514884" sldId="260"/>
+            <ac:picMk id="8" creationId="{F527445F-954D-4901-A14B-22FE9CCB91AB}"/>
+          </ac:picMkLst>
+        </pc:picChg>
+      </pc:sldChg>
+      <pc:sldChg chg="add">
+        <pc:chgData name="Peter McGinty" userId="138e04b35f3df159" providerId="LiveId" clId="{58769E37-A9B1-4E9A-ADE9-11F898BA6085}" dt="2021-08-15T21:52:10.190" v="1"/>
+        <pc:sldMkLst>
+          <pc:docMk/>
+          <pc:sldMk cId="1360403215" sldId="261"/>
+        </pc:sldMkLst>
+      </pc:sldChg>
+      <pc:sldChg chg="modSp add mod ord">
+        <pc:chgData name="Peter McGinty" userId="138e04b35f3df159" providerId="LiveId" clId="{58769E37-A9B1-4E9A-ADE9-11F898BA6085}" dt="2021-08-15T22:50:34.792" v="643"/>
+        <pc:sldMkLst>
+          <pc:docMk/>
+          <pc:sldMk cId="4244487520" sldId="262"/>
+        </pc:sldMkLst>
+        <pc:spChg chg="mod">
+          <ac:chgData name="Peter McGinty" userId="138e04b35f3df159" providerId="LiveId" clId="{58769E37-A9B1-4E9A-ADE9-11F898BA6085}" dt="2021-08-15T22:49:39.816" v="639" actId="20577"/>
+          <ac:spMkLst>
+            <pc:docMk/>
+            <pc:sldMk cId="4244487520" sldId="262"/>
+            <ac:spMk id="2" creationId="{BB8CD0D0-2942-44EC-AC61-52BE97AF7F93}"/>
+          </ac:spMkLst>
+        </pc:spChg>
+      </pc:sldChg>
+      <pc:sldChg chg="addSp delSp modSp add mod modClrScheme chgLayout">
+        <pc:chgData name="Peter McGinty" userId="138e04b35f3df159" providerId="LiveId" clId="{58769E37-A9B1-4E9A-ADE9-11F898BA6085}" dt="2021-08-16T14:53:25.444" v="1607" actId="20577"/>
+        <pc:sldMkLst>
+          <pc:docMk/>
+          <pc:sldMk cId="14562698" sldId="263"/>
+        </pc:sldMkLst>
+        <pc:spChg chg="mod ord">
+          <ac:chgData name="Peter McGinty" userId="138e04b35f3df159" providerId="LiveId" clId="{58769E37-A9B1-4E9A-ADE9-11F898BA6085}" dt="2021-08-16T14:53:25.444" v="1607" actId="20577"/>
+          <ac:spMkLst>
+            <pc:docMk/>
+            <pc:sldMk cId="14562698" sldId="263"/>
+            <ac:spMk id="2" creationId="{C9C54F27-F54E-40C1-AB86-2A9850D04493}"/>
+          </ac:spMkLst>
+        </pc:spChg>
+        <pc:spChg chg="del mod ord">
+          <ac:chgData name="Peter McGinty" userId="138e04b35f3df159" providerId="LiveId" clId="{58769E37-A9B1-4E9A-ADE9-11F898BA6085}" dt="2021-08-15T23:39:25.952" v="1231" actId="700"/>
+          <ac:spMkLst>
+            <pc:docMk/>
+            <pc:sldMk cId="14562698" sldId="263"/>
+            <ac:spMk id="3" creationId="{AC9424D8-954E-4459-9A38-953926F71CA4}"/>
+          </ac:spMkLst>
+        </pc:spChg>
+        <pc:spChg chg="add mod ord">
+          <ac:chgData name="Peter McGinty" userId="138e04b35f3df159" providerId="LiveId" clId="{58769E37-A9B1-4E9A-ADE9-11F898BA6085}" dt="2021-08-15T23:39:25.952" v="1231" actId="700"/>
+          <ac:spMkLst>
+            <pc:docMk/>
+            <pc:sldMk cId="14562698" sldId="263"/>
+            <ac:spMk id="4" creationId="{BE89B0F9-5A23-4726-A706-3C543D4C52E9}"/>
+          </ac:spMkLst>
+        </pc:spChg>
+      </pc:sldChg>
+      <pc:sldChg chg="addSp delSp modSp add mod ord modClrScheme chgLayout">
+        <pc:chgData name="Peter McGinty" userId="138e04b35f3df159" providerId="LiveId" clId="{58769E37-A9B1-4E9A-ADE9-11F898BA6085}" dt="2021-08-16T15:15:34.431" v="1914" actId="20577"/>
+        <pc:sldMkLst>
+          <pc:docMk/>
+          <pc:sldMk cId="4160896528" sldId="264"/>
+        </pc:sldMkLst>
+        <pc:spChg chg="mod ord">
+          <ac:chgData name="Peter McGinty" userId="138e04b35f3df159" providerId="LiveId" clId="{58769E37-A9B1-4E9A-ADE9-11F898BA6085}" dt="2021-08-16T15:15:34.431" v="1914" actId="20577"/>
+          <ac:spMkLst>
+            <pc:docMk/>
+            <pc:sldMk cId="4160896528" sldId="264"/>
+            <ac:spMk id="2" creationId="{9DCD33BB-CCBF-4A68-B5A8-E56898E28402}"/>
+          </ac:spMkLst>
+        </pc:spChg>
+        <pc:spChg chg="del mod ord">
+          <ac:chgData name="Peter McGinty" userId="138e04b35f3df159" providerId="LiveId" clId="{58769E37-A9B1-4E9A-ADE9-11F898BA6085}" dt="2021-08-16T14:44:17.826" v="1529" actId="700"/>
+          <ac:spMkLst>
+            <pc:docMk/>
+            <pc:sldMk cId="4160896528" sldId="264"/>
+            <ac:spMk id="3" creationId="{F5003DD2-0275-4CAF-BB88-A3461328A364}"/>
+          </ac:spMkLst>
+        </pc:spChg>
+        <pc:spChg chg="add mod ord">
+          <ac:chgData name="Peter McGinty" userId="138e04b35f3df159" providerId="LiveId" clId="{58769E37-A9B1-4E9A-ADE9-11F898BA6085}" dt="2021-08-16T14:44:17.826" v="1529" actId="700"/>
+          <ac:spMkLst>
+            <pc:docMk/>
+            <pc:sldMk cId="4160896528" sldId="264"/>
+            <ac:spMk id="4" creationId="{8CC5D8E0-963C-4257-B69E-4899A3BA9742}"/>
+          </ac:spMkLst>
+        </pc:spChg>
+      </pc:sldChg>
+      <pc:sldChg chg="addSp delSp modSp add mod ord modClrScheme chgLayout">
+        <pc:chgData name="Peter McGinty" userId="138e04b35f3df159" providerId="LiveId" clId="{58769E37-A9B1-4E9A-ADE9-11F898BA6085}" dt="2021-08-16T14:51:57.588" v="1601" actId="20578"/>
+        <pc:sldMkLst>
+          <pc:docMk/>
+          <pc:sldMk cId="1995777251" sldId="265"/>
+        </pc:sldMkLst>
+        <pc:spChg chg="mod ord">
+          <ac:chgData name="Peter McGinty" userId="138e04b35f3df159" providerId="LiveId" clId="{58769E37-A9B1-4E9A-ADE9-11F898BA6085}" dt="2021-08-16T14:49:52.519" v="1600" actId="20577"/>
+          <ac:spMkLst>
+            <pc:docMk/>
+            <pc:sldMk cId="1995777251" sldId="265"/>
+            <ac:spMk id="2" creationId="{D8D0C1E8-68CA-46AC-A961-2BD3C264546C}"/>
+          </ac:spMkLst>
+        </pc:spChg>
+        <pc:spChg chg="del mod ord">
+          <ac:chgData name="Peter McGinty" userId="138e04b35f3df159" providerId="LiveId" clId="{58769E37-A9B1-4E9A-ADE9-11F898BA6085}" dt="2021-08-16T14:41:51.263" v="1492" actId="700"/>
+          <ac:spMkLst>
+            <pc:docMk/>
+            <pc:sldMk cId="1995777251" sldId="265"/>
+            <ac:spMk id="3" creationId="{BC197E4E-EE76-430B-9A82-96EDBB62E427}"/>
+          </ac:spMkLst>
+        </pc:spChg>
+        <pc:spChg chg="add mod ord">
+          <ac:chgData name="Peter McGinty" userId="138e04b35f3df159" providerId="LiveId" clId="{58769E37-A9B1-4E9A-ADE9-11F898BA6085}" dt="2021-08-16T14:41:51.263" v="1492" actId="700"/>
+          <ac:spMkLst>
+            <pc:docMk/>
+            <pc:sldMk cId="1995777251" sldId="265"/>
+            <ac:spMk id="4" creationId="{1A6FD951-C768-4480-B55E-7BD167317413}"/>
+          </ac:spMkLst>
+        </pc:spChg>
+      </pc:sldChg>
+      <pc:sldChg chg="add ord">
+        <pc:chgData name="Peter McGinty" userId="138e04b35f3df159" providerId="LiveId" clId="{58769E37-A9B1-4E9A-ADE9-11F898BA6085}" dt="2021-08-15T22:32:22.416" v="430"/>
+        <pc:sldMkLst>
+          <pc:docMk/>
+          <pc:sldMk cId="3412870619" sldId="266"/>
+        </pc:sldMkLst>
+      </pc:sldChg>
+      <pc:sldChg chg="add">
+        <pc:chgData name="Peter McGinty" userId="138e04b35f3df159" providerId="LiveId" clId="{58769E37-A9B1-4E9A-ADE9-11F898BA6085}" dt="2021-08-15T21:52:10.190" v="1"/>
+        <pc:sldMkLst>
+          <pc:docMk/>
+          <pc:sldMk cId="4133629237" sldId="267"/>
+        </pc:sldMkLst>
+      </pc:sldChg>
+      <pc:sldChg chg="add">
+        <pc:chgData name="Peter McGinty" userId="138e04b35f3df159" providerId="LiveId" clId="{58769E37-A9B1-4E9A-ADE9-11F898BA6085}" dt="2021-08-15T21:52:10.190" v="1"/>
+        <pc:sldMkLst>
+          <pc:docMk/>
+          <pc:sldMk cId="1606028670" sldId="268"/>
+        </pc:sldMkLst>
+      </pc:sldChg>
+      <pc:sldChg chg="add">
+        <pc:chgData name="Peter McGinty" userId="138e04b35f3df159" providerId="LiveId" clId="{58769E37-A9B1-4E9A-ADE9-11F898BA6085}" dt="2021-08-15T21:52:10.190" v="1"/>
+        <pc:sldMkLst>
+          <pc:docMk/>
+          <pc:sldMk cId="1295996578" sldId="269"/>
+        </pc:sldMkLst>
+      </pc:sldChg>
+      <pc:sldChg chg="add">
+        <pc:chgData name="Peter McGinty" userId="138e04b35f3df159" providerId="LiveId" clId="{58769E37-A9B1-4E9A-ADE9-11F898BA6085}" dt="2021-08-15T21:52:10.190" v="1"/>
+        <pc:sldMkLst>
+          <pc:docMk/>
+          <pc:sldMk cId="1580379055" sldId="270"/>
+        </pc:sldMkLst>
+      </pc:sldChg>
+      <pc:sldChg chg="add del">
+        <pc:chgData name="Peter McGinty" userId="138e04b35f3df159" providerId="LiveId" clId="{58769E37-A9B1-4E9A-ADE9-11F898BA6085}" dt="2021-08-15T22:30:59.624" v="423" actId="47"/>
+        <pc:sldMkLst>
+          <pc:docMk/>
+          <pc:sldMk cId="1804999901" sldId="271"/>
+        </pc:sldMkLst>
+      </pc:sldChg>
+      <pc:sldChg chg="addSp delSp modSp add mod ord modClrScheme chgLayout">
+        <pc:chgData name="Peter McGinty" userId="138e04b35f3df159" providerId="LiveId" clId="{58769E37-A9B1-4E9A-ADE9-11F898BA6085}" dt="2021-08-16T14:47:37.050" v="1557" actId="20577"/>
+        <pc:sldMkLst>
+          <pc:docMk/>
+          <pc:sldMk cId="3206573147" sldId="272"/>
+        </pc:sldMkLst>
+        <pc:spChg chg="mod ord">
+          <ac:chgData name="Peter McGinty" userId="138e04b35f3df159" providerId="LiveId" clId="{58769E37-A9B1-4E9A-ADE9-11F898BA6085}" dt="2021-08-16T14:47:37.050" v="1557" actId="20577"/>
+          <ac:spMkLst>
+            <pc:docMk/>
+            <pc:sldMk cId="3206573147" sldId="272"/>
+            <ac:spMk id="2" creationId="{5956761D-5205-4472-8FF3-4BAE85838467}"/>
+          </ac:spMkLst>
+        </pc:spChg>
+        <pc:spChg chg="del mod ord">
+          <ac:chgData name="Peter McGinty" userId="138e04b35f3df159" providerId="LiveId" clId="{58769E37-A9B1-4E9A-ADE9-11F898BA6085}" dt="2021-08-15T23:42:29.140" v="1266" actId="700"/>
+          <ac:spMkLst>
+            <pc:docMk/>
+            <pc:sldMk cId="3206573147" sldId="272"/>
+            <ac:spMk id="3" creationId="{85800ABD-06D3-4E4E-9C3F-1E8C6BB3423E}"/>
+          </ac:spMkLst>
+        </pc:spChg>
+        <pc:spChg chg="add mod ord">
+          <ac:chgData name="Peter McGinty" userId="138e04b35f3df159" providerId="LiveId" clId="{58769E37-A9B1-4E9A-ADE9-11F898BA6085}" dt="2021-08-15T23:42:29.140" v="1266" actId="700"/>
+          <ac:spMkLst>
+            <pc:docMk/>
+            <pc:sldMk cId="3206573147" sldId="272"/>
+            <ac:spMk id="4" creationId="{90D77681-B9BB-4F38-8213-A3693E790B50}"/>
+          </ac:spMkLst>
+        </pc:spChg>
+      </pc:sldChg>
+      <pc:sldChg chg="add">
+        <pc:chgData name="Peter McGinty" userId="138e04b35f3df159" providerId="LiveId" clId="{58769E37-A9B1-4E9A-ADE9-11F898BA6085}" dt="2021-08-15T21:52:10.190" v="1"/>
+        <pc:sldMkLst>
+          <pc:docMk/>
+          <pc:sldMk cId="4139861047" sldId="273"/>
+        </pc:sldMkLst>
+      </pc:sldChg>
+      <pc:sldChg chg="add">
+        <pc:chgData name="Peter McGinty" userId="138e04b35f3df159" providerId="LiveId" clId="{58769E37-A9B1-4E9A-ADE9-11F898BA6085}" dt="2021-08-15T21:52:10.190" v="1"/>
+        <pc:sldMkLst>
+          <pc:docMk/>
+          <pc:sldMk cId="2944802119" sldId="274"/>
+        </pc:sldMkLst>
+      </pc:sldChg>
+      <pc:sldChg chg="add del">
+        <pc:chgData name="Peter McGinty" userId="138e04b35f3df159" providerId="LiveId" clId="{58769E37-A9B1-4E9A-ADE9-11F898BA6085}" dt="2021-08-15T22:30:52.726" v="422" actId="47"/>
+        <pc:sldMkLst>
+          <pc:docMk/>
+          <pc:sldMk cId="1375106812" sldId="275"/>
+        </pc:sldMkLst>
+      </pc:sldChg>
+      <pc:sldChg chg="addSp delSp modSp new mod modClrScheme chgLayout">
+        <pc:chgData name="Peter McGinty" userId="138e04b35f3df159" providerId="LiveId" clId="{58769E37-A9B1-4E9A-ADE9-11F898BA6085}" dt="2021-08-16T14:13:50.683" v="1409" actId="700"/>
+        <pc:sldMkLst>
+          <pc:docMk/>
+          <pc:sldMk cId="2171811396" sldId="275"/>
+        </pc:sldMkLst>
+        <pc:spChg chg="mod ord">
+          <ac:chgData name="Peter McGinty" userId="138e04b35f3df159" providerId="LiveId" clId="{58769E37-A9B1-4E9A-ADE9-11F898BA6085}" dt="2021-08-16T14:13:50.683" v="1409" actId="700"/>
+          <ac:spMkLst>
+            <pc:docMk/>
+            <pc:sldMk cId="2171811396" sldId="275"/>
+            <ac:spMk id="2" creationId="{802F810C-22A0-456D-A9D8-92E244F8B0C5}"/>
+          </ac:spMkLst>
+        </pc:spChg>
+        <pc:spChg chg="del mod ord">
+          <ac:chgData name="Peter McGinty" userId="138e04b35f3df159" providerId="LiveId" clId="{58769E37-A9B1-4E9A-ADE9-11F898BA6085}" dt="2021-08-16T14:13:50.683" v="1409" actId="700"/>
+          <ac:spMkLst>
+            <pc:docMk/>
+            <pc:sldMk cId="2171811396" sldId="275"/>
+            <ac:spMk id="3" creationId="{EA1D4C28-25A0-4E4E-8E13-75124C5A5347}"/>
+          </ac:spMkLst>
+        </pc:spChg>
+        <pc:spChg chg="add mod ord">
+          <ac:chgData name="Peter McGinty" userId="138e04b35f3df159" providerId="LiveId" clId="{58769E37-A9B1-4E9A-ADE9-11F898BA6085}" dt="2021-08-16T14:13:50.683" v="1409" actId="700"/>
+          <ac:spMkLst>
+            <pc:docMk/>
+            <pc:sldMk cId="2171811396" sldId="275"/>
+            <ac:spMk id="4" creationId="{1CF87583-E70B-4E3F-B239-F5BBB9792296}"/>
+          </ac:spMkLst>
+        </pc:spChg>
+        <pc:spChg chg="add mod ord">
+          <ac:chgData name="Peter McGinty" userId="138e04b35f3df159" providerId="LiveId" clId="{58769E37-A9B1-4E9A-ADE9-11F898BA6085}" dt="2021-08-16T14:13:50.683" v="1409" actId="700"/>
+          <ac:spMkLst>
+            <pc:docMk/>
+            <pc:sldMk cId="2171811396" sldId="275"/>
+            <ac:spMk id="5" creationId="{EE589FCE-ED4A-4E7A-8D5E-60037AF2C1EE}"/>
+          </ac:spMkLst>
+        </pc:spChg>
+      </pc:sldChg>
+      <pc:sldChg chg="addSp delSp modSp add mod modClrScheme chgLayout">
+        <pc:chgData name="Peter McGinty" userId="138e04b35f3df159" providerId="LiveId" clId="{58769E37-A9B1-4E9A-ADE9-11F898BA6085}" dt="2021-08-16T15:12:52.854" v="1898" actId="1076"/>
+        <pc:sldMkLst>
+          <pc:docMk/>
+          <pc:sldMk cId="1074021759" sldId="276"/>
+        </pc:sldMkLst>
+        <pc:spChg chg="mod ord">
+          <ac:chgData name="Peter McGinty" userId="138e04b35f3df159" providerId="LiveId" clId="{58769E37-A9B1-4E9A-ADE9-11F898BA6085}" dt="2021-08-16T15:09:10.017" v="1886" actId="6549"/>
+          <ac:spMkLst>
+            <pc:docMk/>
+            <pc:sldMk cId="1074021759" sldId="276"/>
+            <ac:spMk id="2" creationId="{F72245F1-A625-4B21-B541-2F3ADA5C2588}"/>
+          </ac:spMkLst>
+        </pc:spChg>
+        <pc:spChg chg="del">
+          <ac:chgData name="Peter McGinty" userId="138e04b35f3df159" providerId="LiveId" clId="{58769E37-A9B1-4E9A-ADE9-11F898BA6085}" dt="2021-08-16T15:08:36.713" v="1866" actId="478"/>
+          <ac:spMkLst>
+            <pc:docMk/>
+            <pc:sldMk cId="1074021759" sldId="276"/>
+            <ac:spMk id="4" creationId="{84E7AE25-ED64-4986-B2D8-91404B900FE1}"/>
+          </ac:spMkLst>
+        </pc:spChg>
+        <pc:spChg chg="add del mod">
+          <ac:chgData name="Peter McGinty" userId="138e04b35f3df159" providerId="LiveId" clId="{58769E37-A9B1-4E9A-ADE9-11F898BA6085}" dt="2021-08-16T15:08:40.256" v="1867" actId="478"/>
+          <ac:spMkLst>
+            <pc:docMk/>
+            <pc:sldMk cId="1074021759" sldId="276"/>
+            <ac:spMk id="5" creationId="{1F173FAA-3EE4-45B7-AE8E-444D0F1D38A4}"/>
+          </ac:spMkLst>
+        </pc:spChg>
+        <pc:picChg chg="add del mod">
+          <ac:chgData name="Peter McGinty" userId="138e04b35f3df159" providerId="LiveId" clId="{58769E37-A9B1-4E9A-ADE9-11F898BA6085}" dt="2021-08-16T15:12:43.272" v="1893" actId="478"/>
+          <ac:picMkLst>
+            <pc:docMk/>
+            <pc:sldMk cId="1074021759" sldId="276"/>
+            <ac:picMk id="7" creationId="{AECF730D-6771-4FF5-BF8B-8FF63C12D59D}"/>
+          </ac:picMkLst>
+        </pc:picChg>
+        <pc:picChg chg="del mod">
+          <ac:chgData name="Peter McGinty" userId="138e04b35f3df159" providerId="LiveId" clId="{58769E37-A9B1-4E9A-ADE9-11F898BA6085}" dt="2021-08-16T15:12:20.632" v="1889" actId="478"/>
+          <ac:picMkLst>
+            <pc:docMk/>
+            <pc:sldMk cId="1074021759" sldId="276"/>
+            <ac:picMk id="8" creationId="{F527445F-954D-4901-A14B-22FE9CCB91AB}"/>
+          </ac:picMkLst>
+        </pc:picChg>
+        <pc:picChg chg="add mod">
+          <ac:chgData name="Peter McGinty" userId="138e04b35f3df159" providerId="LiveId" clId="{58769E37-A9B1-4E9A-ADE9-11F898BA6085}" dt="2021-08-16T15:12:52.854" v="1898" actId="1076"/>
+          <ac:picMkLst>
+            <pc:docMk/>
+            <pc:sldMk cId="1074021759" sldId="276"/>
+            <ac:picMk id="10" creationId="{DC89D4B3-1184-452C-8D77-8CA84ADC524B}"/>
+          </ac:picMkLst>
+        </pc:picChg>
+      </pc:sldChg>
+      <pc:sldChg chg="new del">
+        <pc:chgData name="Peter McGinty" userId="138e04b35f3df159" providerId="LiveId" clId="{58769E37-A9B1-4E9A-ADE9-11F898BA6085}" dt="2021-08-16T14:47:14.298" v="1548" actId="2696"/>
+        <pc:sldMkLst>
+          <pc:docMk/>
+          <pc:sldMk cId="2571791367" sldId="276"/>
+        </pc:sldMkLst>
+      </pc:sldChg>
+      <pc:sldChg chg="modSp new mod">
+        <pc:chgData name="Peter McGinty" userId="138e04b35f3df159" providerId="LiveId" clId="{58769E37-A9B1-4E9A-ADE9-11F898BA6085}" dt="2021-08-16T15:16:37.375" v="1949" actId="20577"/>
+        <pc:sldMkLst>
+          <pc:docMk/>
+          <pc:sldMk cId="1408481453" sldId="277"/>
+        </pc:sldMkLst>
+        <pc:spChg chg="mod">
+          <ac:chgData name="Peter McGinty" userId="138e04b35f3df159" providerId="LiveId" clId="{58769E37-A9B1-4E9A-ADE9-11F898BA6085}" dt="2021-08-16T15:16:37.375" v="1949" actId="20577"/>
+          <ac:spMkLst>
+            <pc:docMk/>
+            <pc:sldMk cId="1408481453" sldId="277"/>
+            <ac:spMk id="2" creationId="{18F33E80-BFEC-4C94-8618-514A7466C1D0}"/>
+          </ac:spMkLst>
+        </pc:spChg>
+      </pc:sldChg>
+      <pc:sldChg chg="new del">
+        <pc:chgData name="Peter McGinty" userId="138e04b35f3df159" providerId="LiveId" clId="{58769E37-A9B1-4E9A-ADE9-11F898BA6085}" dt="2021-08-16T14:41:09.762" v="1489" actId="2696"/>
+        <pc:sldMkLst>
+          <pc:docMk/>
+          <pc:sldMk cId="4273763004" sldId="277"/>
+        </pc:sldMkLst>
+      </pc:sldChg>
+      <pc:sldChg chg="addSp delSp modSp new mod modClrScheme chgLayout">
+        <pc:chgData name="Peter McGinty" userId="138e04b35f3df159" providerId="LiveId" clId="{58769E37-A9B1-4E9A-ADE9-11F898BA6085}" dt="2021-08-16T15:19:38.831" v="1989" actId="20577"/>
+        <pc:sldMkLst>
+          <pc:docMk/>
+          <pc:sldMk cId="2137941897" sldId="278"/>
+        </pc:sldMkLst>
+        <pc:spChg chg="del mod ord">
+          <ac:chgData name="Peter McGinty" userId="138e04b35f3df159" providerId="LiveId" clId="{58769E37-A9B1-4E9A-ADE9-11F898BA6085}" dt="2021-08-16T15:18:57.415" v="1952" actId="700"/>
+          <ac:spMkLst>
+            <pc:docMk/>
+            <pc:sldMk cId="2137941897" sldId="278"/>
+            <ac:spMk id="2" creationId="{39E85C5B-6871-4D97-818D-CE5D4E239220}"/>
+          </ac:spMkLst>
+        </pc:spChg>
+        <pc:spChg chg="del mod ord">
+          <ac:chgData name="Peter McGinty" userId="138e04b35f3df159" providerId="LiveId" clId="{58769E37-A9B1-4E9A-ADE9-11F898BA6085}" dt="2021-08-16T15:18:57.415" v="1952" actId="700"/>
+          <ac:spMkLst>
+            <pc:docMk/>
+            <pc:sldMk cId="2137941897" sldId="278"/>
+            <ac:spMk id="3" creationId="{72FE0FBE-C0F5-4BB1-B0D5-32C980AF34FA}"/>
+          </ac:spMkLst>
+        </pc:spChg>
+        <pc:spChg chg="add mod ord">
+          <ac:chgData name="Peter McGinty" userId="138e04b35f3df159" providerId="LiveId" clId="{58769E37-A9B1-4E9A-ADE9-11F898BA6085}" dt="2021-08-16T15:19:10.648" v="1958" actId="20577"/>
+          <ac:spMkLst>
+            <pc:docMk/>
+            <pc:sldMk cId="2137941897" sldId="278"/>
+            <ac:spMk id="4" creationId="{6BA38571-1326-4F3F-B358-9CDC3BCF5605}"/>
+          </ac:spMkLst>
+        </pc:spChg>
+        <pc:spChg chg="add mod ord">
+          <ac:chgData name="Peter McGinty" userId="138e04b35f3df159" providerId="LiveId" clId="{58769E37-A9B1-4E9A-ADE9-11F898BA6085}" dt="2021-08-16T15:19:38.831" v="1989" actId="20577"/>
+          <ac:spMkLst>
+            <pc:docMk/>
+            <pc:sldMk cId="2137941897" sldId="278"/>
+            <ac:spMk id="5" creationId="{7C471EE2-A287-4506-8239-9CF76675125F}"/>
+          </ac:spMkLst>
+        </pc:spChg>
+      </pc:sldChg>
+      <pc:sldMasterChg chg="modSp modSldLayout">
+        <pc:chgData name="Peter McGinty" userId="138e04b35f3df159" providerId="LiveId" clId="{58769E37-A9B1-4E9A-ADE9-11F898BA6085}" dt="2021-08-15T21:45:10.854" v="0"/>
+        <pc:sldMasterMkLst>
+          <pc:docMk/>
+          <pc:sldMasterMk cId="3777914966" sldId="2147483648"/>
+        </pc:sldMasterMkLst>
+        <pc:spChg chg="mod">
+          <ac:chgData name="Peter McGinty" userId="138e04b35f3df159" providerId="LiveId" clId="{58769E37-A9B1-4E9A-ADE9-11F898BA6085}" dt="2021-08-15T21:45:10.854" v="0"/>
+          <ac:spMkLst>
+            <pc:docMk/>
+            <pc:sldMasterMk cId="3777914966" sldId="2147483648"/>
+            <ac:spMk id="2" creationId="{472C5935-4AA3-45BD-A2AD-A19F3D04F782}"/>
+          </ac:spMkLst>
+        </pc:spChg>
+        <pc:spChg chg="mod">
+          <ac:chgData name="Peter McGinty" userId="138e04b35f3df159" providerId="LiveId" clId="{58769E37-A9B1-4E9A-ADE9-11F898BA6085}" dt="2021-08-15T21:45:10.854" v="0"/>
+          <ac:spMkLst>
+            <pc:docMk/>
+            <pc:sldMasterMk cId="3777914966" sldId="2147483648"/>
+            <ac:spMk id="3" creationId="{FC25450A-CD2D-4E74-A573-DA1F8F0635E6}"/>
+          </ac:spMkLst>
+        </pc:spChg>
+        <pc:spChg chg="mod">
+          <ac:chgData name="Peter McGinty" userId="138e04b35f3df159" providerId="LiveId" clId="{58769E37-A9B1-4E9A-ADE9-11F898BA6085}" dt="2021-08-15T21:45:10.854" v="0"/>
+          <ac:spMkLst>
+            <pc:docMk/>
+            <pc:sldMasterMk cId="3777914966" sldId="2147483648"/>
+            <ac:spMk id="4" creationId="{33890845-E65D-4A81-93D7-EE1190EDBBEC}"/>
+          </ac:spMkLst>
+        </pc:spChg>
+        <pc:spChg chg="mod">
+          <ac:chgData name="Peter McGinty" userId="138e04b35f3df159" providerId="LiveId" clId="{58769E37-A9B1-4E9A-ADE9-11F898BA6085}" dt="2021-08-15T21:45:10.854" v="0"/>
+          <ac:spMkLst>
+            <pc:docMk/>
+            <pc:sldMasterMk cId="3777914966" sldId="2147483648"/>
+            <ac:spMk id="5" creationId="{62D03B44-A7B0-484F-B05C-B9AA237CBA80}"/>
+          </ac:spMkLst>
+        </pc:spChg>
+        <pc:spChg chg="mod">
+          <ac:chgData name="Peter McGinty" userId="138e04b35f3df159" providerId="LiveId" clId="{58769E37-A9B1-4E9A-ADE9-11F898BA6085}" dt="2021-08-15T21:45:10.854" v="0"/>
+          <ac:spMkLst>
+            <pc:docMk/>
+            <pc:sldMasterMk cId="3777914966" sldId="2147483648"/>
+            <ac:spMk id="6" creationId="{AE7C505C-D9CF-46E7-95CB-088A348A0C13}"/>
+          </ac:spMkLst>
+        </pc:spChg>
+        <pc:sldLayoutChg chg="modSp">
+          <pc:chgData name="Peter McGinty" userId="138e04b35f3df159" providerId="LiveId" clId="{58769E37-A9B1-4E9A-ADE9-11F898BA6085}" dt="2021-08-15T21:45:10.854" v="0"/>
+          <pc:sldLayoutMkLst>
+            <pc:docMk/>
+            <pc:sldMasterMk cId="3777914966" sldId="2147483648"/>
+            <pc:sldLayoutMk cId="2153645582" sldId="2147483649"/>
+          </pc:sldLayoutMkLst>
+          <pc:spChg chg="mod">
+            <ac:chgData name="Peter McGinty" userId="138e04b35f3df159" providerId="LiveId" clId="{58769E37-A9B1-4E9A-ADE9-11F898BA6085}" dt="2021-08-15T21:45:10.854" v="0"/>
+            <ac:spMkLst>
+              <pc:docMk/>
+              <pc:sldMasterMk cId="3777914966" sldId="2147483648"/>
+              <pc:sldLayoutMk cId="2153645582" sldId="2147483649"/>
+              <ac:spMk id="2" creationId="{69EFA8BE-6470-4B77-A0D3-871C890931B7}"/>
+            </ac:spMkLst>
+          </pc:spChg>
+          <pc:spChg chg="mod">
+            <ac:chgData name="Peter McGinty" userId="138e04b35f3df159" providerId="LiveId" clId="{58769E37-A9B1-4E9A-ADE9-11F898BA6085}" dt="2021-08-15T21:45:10.854" v="0"/>
+            <ac:spMkLst>
+              <pc:docMk/>
+              <pc:sldMasterMk cId="3777914966" sldId="2147483648"/>
+              <pc:sldLayoutMk cId="2153645582" sldId="2147483649"/>
+              <ac:spMk id="3" creationId="{2945FA10-0214-426E-BBB6-0E158B1A87E8}"/>
+            </ac:spMkLst>
+          </pc:spChg>
+        </pc:sldLayoutChg>
+        <pc:sldLayoutChg chg="modSp">
+          <pc:chgData name="Peter McGinty" userId="138e04b35f3df159" providerId="LiveId" clId="{58769E37-A9B1-4E9A-ADE9-11F898BA6085}" dt="2021-08-15T21:45:10.854" v="0"/>
+          <pc:sldLayoutMkLst>
+            <pc:docMk/>
+            <pc:sldMasterMk cId="3777914966" sldId="2147483648"/>
+            <pc:sldLayoutMk cId="1749687876" sldId="2147483651"/>
+          </pc:sldLayoutMkLst>
+          <pc:spChg chg="mod">
+            <ac:chgData name="Peter McGinty" userId="138e04b35f3df159" providerId="LiveId" clId="{58769E37-A9B1-4E9A-ADE9-11F898BA6085}" dt="2021-08-15T21:45:10.854" v="0"/>
+            <ac:spMkLst>
+              <pc:docMk/>
+              <pc:sldMasterMk cId="3777914966" sldId="2147483648"/>
+              <pc:sldLayoutMk cId="1749687876" sldId="2147483651"/>
+              <ac:spMk id="2" creationId="{3F52FC24-C454-464A-B791-E4839F046DCA}"/>
+            </ac:spMkLst>
+          </pc:spChg>
+          <pc:spChg chg="mod">
+            <ac:chgData name="Peter McGinty" userId="138e04b35f3df159" providerId="LiveId" clId="{58769E37-A9B1-4E9A-ADE9-11F898BA6085}" dt="2021-08-15T21:45:10.854" v="0"/>
+            <ac:spMkLst>
+              <pc:docMk/>
+              <pc:sldMasterMk cId="3777914966" sldId="2147483648"/>
+              <pc:sldLayoutMk cId="1749687876" sldId="2147483651"/>
+              <ac:spMk id="3" creationId="{089BB5F9-DCEA-4195-8761-5A17B008EA60}"/>
+            </ac:spMkLst>
+          </pc:spChg>
+        </pc:sldLayoutChg>
+        <pc:sldLayoutChg chg="modSp">
+          <pc:chgData name="Peter McGinty" userId="138e04b35f3df159" providerId="LiveId" clId="{58769E37-A9B1-4E9A-ADE9-11F898BA6085}" dt="2021-08-15T21:45:10.854" v="0"/>
+          <pc:sldLayoutMkLst>
+            <pc:docMk/>
+            <pc:sldMasterMk cId="3777914966" sldId="2147483648"/>
+            <pc:sldLayoutMk cId="3884811684" sldId="2147483652"/>
+          </pc:sldLayoutMkLst>
+          <pc:spChg chg="mod">
+            <ac:chgData name="Peter McGinty" userId="138e04b35f3df159" providerId="LiveId" clId="{58769E37-A9B1-4E9A-ADE9-11F898BA6085}" dt="2021-08-15T21:45:10.854" v="0"/>
+            <ac:spMkLst>
+              <pc:docMk/>
+              <pc:sldMasterMk cId="3777914966" sldId="2147483648"/>
+              <pc:sldLayoutMk cId="3884811684" sldId="2147483652"/>
+              <ac:spMk id="3" creationId="{0DA6672F-9990-4093-8E59-3A712973549A}"/>
+            </ac:spMkLst>
+          </pc:spChg>
+          <pc:spChg chg="mod">
+            <ac:chgData name="Peter McGinty" userId="138e04b35f3df159" providerId="LiveId" clId="{58769E37-A9B1-4E9A-ADE9-11F898BA6085}" dt="2021-08-15T21:45:10.854" v="0"/>
+            <ac:spMkLst>
+              <pc:docMk/>
+              <pc:sldMasterMk cId="3777914966" sldId="2147483648"/>
+              <pc:sldLayoutMk cId="3884811684" sldId="2147483652"/>
+              <ac:spMk id="4" creationId="{3B21657F-1B1D-4D2B-9E9A-33489F3643A0}"/>
+            </ac:spMkLst>
+          </pc:spChg>
+        </pc:sldLayoutChg>
+        <pc:sldLayoutChg chg="modSp">
+          <pc:chgData name="Peter McGinty" userId="138e04b35f3df159" providerId="LiveId" clId="{58769E37-A9B1-4E9A-ADE9-11F898BA6085}" dt="2021-08-15T21:45:10.854" v="0"/>
+          <pc:sldLayoutMkLst>
+            <pc:docMk/>
+            <pc:sldMasterMk cId="3777914966" sldId="2147483648"/>
+            <pc:sldLayoutMk cId="3564373246" sldId="2147483653"/>
+          </pc:sldLayoutMkLst>
+          <pc:spChg chg="mod">
+            <ac:chgData name="Peter McGinty" userId="138e04b35f3df159" providerId="LiveId" clId="{58769E37-A9B1-4E9A-ADE9-11F898BA6085}" dt="2021-08-15T21:45:10.854" v="0"/>
+            <ac:spMkLst>
+              <pc:docMk/>
+              <pc:sldMasterMk cId="3777914966" sldId="2147483648"/>
+              <pc:sldLayoutMk cId="3564373246" sldId="2147483653"/>
+              <ac:spMk id="2" creationId="{2F1D1480-03BD-43EC-8B64-EE418001FBC7}"/>
+            </ac:spMkLst>
+          </pc:spChg>
+          <pc:spChg chg="mod">
+            <ac:chgData name="Peter McGinty" userId="138e04b35f3df159" providerId="LiveId" clId="{58769E37-A9B1-4E9A-ADE9-11F898BA6085}" dt="2021-08-15T21:45:10.854" v="0"/>
+            <ac:spMkLst>
+              <pc:docMk/>
+              <pc:sldMasterMk cId="3777914966" sldId="2147483648"/>
+              <pc:sldLayoutMk cId="3564373246" sldId="2147483653"/>
+              <ac:spMk id="3" creationId="{E922B0BC-31F9-4657-A4E7-5E56D7CCABF1}"/>
+            </ac:spMkLst>
+          </pc:spChg>
+          <pc:spChg chg="mod">
+            <ac:chgData name="Peter McGinty" userId="138e04b35f3df159" providerId="LiveId" clId="{58769E37-A9B1-4E9A-ADE9-11F898BA6085}" dt="2021-08-15T21:45:10.854" v="0"/>
+            <ac:spMkLst>
+              <pc:docMk/>
+              <pc:sldMasterMk cId="3777914966" sldId="2147483648"/>
+              <pc:sldLayoutMk cId="3564373246" sldId="2147483653"/>
+              <ac:spMk id="4" creationId="{8D09D925-AB1B-49B2-9430-4DB4FBA60847}"/>
+            </ac:spMkLst>
+          </pc:spChg>
+          <pc:spChg chg="mod">
+            <ac:chgData name="Peter McGinty" userId="138e04b35f3df159" providerId="LiveId" clId="{58769E37-A9B1-4E9A-ADE9-11F898BA6085}" dt="2021-08-15T21:45:10.854" v="0"/>
+            <ac:spMkLst>
+              <pc:docMk/>
+              <pc:sldMasterMk cId="3777914966" sldId="2147483648"/>
+              <pc:sldLayoutMk cId="3564373246" sldId="2147483653"/>
+              <ac:spMk id="5" creationId="{14D4FCAA-4914-4E89-9833-37D30C156F33}"/>
+            </ac:spMkLst>
+          </pc:spChg>
+          <pc:spChg chg="mod">
+            <ac:chgData name="Peter McGinty" userId="138e04b35f3df159" providerId="LiveId" clId="{58769E37-A9B1-4E9A-ADE9-11F898BA6085}" dt="2021-08-15T21:45:10.854" v="0"/>
+            <ac:spMkLst>
+              <pc:docMk/>
+              <pc:sldMasterMk cId="3777914966" sldId="2147483648"/>
+              <pc:sldLayoutMk cId="3564373246" sldId="2147483653"/>
+              <ac:spMk id="6" creationId="{54480C19-9120-42D8-BCED-E64FE52E33D6}"/>
+            </ac:spMkLst>
+          </pc:spChg>
+        </pc:sldLayoutChg>
+        <pc:sldLayoutChg chg="modSp">
+          <pc:chgData name="Peter McGinty" userId="138e04b35f3df159" providerId="LiveId" clId="{58769E37-A9B1-4E9A-ADE9-11F898BA6085}" dt="2021-08-15T21:45:10.854" v="0"/>
+          <pc:sldLayoutMkLst>
+            <pc:docMk/>
+            <pc:sldMasterMk cId="3777914966" sldId="2147483648"/>
+            <pc:sldLayoutMk cId="2843147243" sldId="2147483656"/>
+          </pc:sldLayoutMkLst>
+          <pc:spChg chg="mod">
+            <ac:chgData name="Peter McGinty" userId="138e04b35f3df159" providerId="LiveId" clId="{58769E37-A9B1-4E9A-ADE9-11F898BA6085}" dt="2021-08-15T21:45:10.854" v="0"/>
+            <ac:spMkLst>
+              <pc:docMk/>
+              <pc:sldMasterMk cId="3777914966" sldId="2147483648"/>
+              <pc:sldLayoutMk cId="2843147243" sldId="2147483656"/>
+              <ac:spMk id="2" creationId="{5EF0414A-FD1E-41ED-8843-0750D86707C1}"/>
+            </ac:spMkLst>
+          </pc:spChg>
+          <pc:spChg chg="mod">
+            <ac:chgData name="Peter McGinty" userId="138e04b35f3df159" providerId="LiveId" clId="{58769E37-A9B1-4E9A-ADE9-11F898BA6085}" dt="2021-08-15T21:45:10.854" v="0"/>
+            <ac:spMkLst>
+              <pc:docMk/>
+              <pc:sldMasterMk cId="3777914966" sldId="2147483648"/>
+              <pc:sldLayoutMk cId="2843147243" sldId="2147483656"/>
+              <ac:spMk id="3" creationId="{1976D95A-C837-4B7A-B46C-0FA8D5A03719}"/>
+            </ac:spMkLst>
+          </pc:spChg>
+          <pc:spChg chg="mod">
+            <ac:chgData name="Peter McGinty" userId="138e04b35f3df159" providerId="LiveId" clId="{58769E37-A9B1-4E9A-ADE9-11F898BA6085}" dt="2021-08-15T21:45:10.854" v="0"/>
+            <ac:spMkLst>
+              <pc:docMk/>
+              <pc:sldMasterMk cId="3777914966" sldId="2147483648"/>
+              <pc:sldLayoutMk cId="2843147243" sldId="2147483656"/>
+              <ac:spMk id="4" creationId="{85A5544A-18A5-4E64-9EE2-0A75164C4C00}"/>
+            </ac:spMkLst>
+          </pc:spChg>
+        </pc:sldLayoutChg>
+        <pc:sldLayoutChg chg="modSp">
+          <pc:chgData name="Peter McGinty" userId="138e04b35f3df159" providerId="LiveId" clId="{58769E37-A9B1-4E9A-ADE9-11F898BA6085}" dt="2021-08-15T21:45:10.854" v="0"/>
+          <pc:sldLayoutMkLst>
+            <pc:docMk/>
+            <pc:sldMasterMk cId="3777914966" sldId="2147483648"/>
+            <pc:sldLayoutMk cId="2486252067" sldId="2147483657"/>
+          </pc:sldLayoutMkLst>
+          <pc:spChg chg="mod">
+            <ac:chgData name="Peter McGinty" userId="138e04b35f3df159" providerId="LiveId" clId="{58769E37-A9B1-4E9A-ADE9-11F898BA6085}" dt="2021-08-15T21:45:10.854" v="0"/>
+            <ac:spMkLst>
+              <pc:docMk/>
+              <pc:sldMasterMk cId="3777914966" sldId="2147483648"/>
+              <pc:sldLayoutMk cId="2486252067" sldId="2147483657"/>
+              <ac:spMk id="2" creationId="{C44A4DEE-E297-4119-B407-835F89F6EFD9}"/>
+            </ac:spMkLst>
+          </pc:spChg>
+          <pc:spChg chg="mod">
+            <ac:chgData name="Peter McGinty" userId="138e04b35f3df159" providerId="LiveId" clId="{58769E37-A9B1-4E9A-ADE9-11F898BA6085}" dt="2021-08-15T21:45:10.854" v="0"/>
+            <ac:spMkLst>
+              <pc:docMk/>
+              <pc:sldMasterMk cId="3777914966" sldId="2147483648"/>
+              <pc:sldLayoutMk cId="2486252067" sldId="2147483657"/>
+              <ac:spMk id="3" creationId="{6AF88D61-23F0-41F1-BB08-F1574EED8FEE}"/>
+            </ac:spMkLst>
+          </pc:spChg>
+          <pc:spChg chg="mod">
+            <ac:chgData name="Peter McGinty" userId="138e04b35f3df159" providerId="LiveId" clId="{58769E37-A9B1-4E9A-ADE9-11F898BA6085}" dt="2021-08-15T21:45:10.854" v="0"/>
+            <ac:spMkLst>
+              <pc:docMk/>
+              <pc:sldMasterMk cId="3777914966" sldId="2147483648"/>
+              <pc:sldLayoutMk cId="2486252067" sldId="2147483657"/>
+              <ac:spMk id="4" creationId="{E5C49FCD-77CC-46B8-90BA-91815084A522}"/>
+            </ac:spMkLst>
+          </pc:spChg>
+        </pc:sldLayoutChg>
+        <pc:sldLayoutChg chg="modSp">
+          <pc:chgData name="Peter McGinty" userId="138e04b35f3df159" providerId="LiveId" clId="{58769E37-A9B1-4E9A-ADE9-11F898BA6085}" dt="2021-08-15T21:45:10.854" v="0"/>
+          <pc:sldLayoutMkLst>
+            <pc:docMk/>
+            <pc:sldMasterMk cId="3777914966" sldId="2147483648"/>
+            <pc:sldLayoutMk cId="2997959970" sldId="2147483659"/>
+          </pc:sldLayoutMkLst>
+          <pc:spChg chg="mod">
+            <ac:chgData name="Peter McGinty" userId="138e04b35f3df159" providerId="LiveId" clId="{58769E37-A9B1-4E9A-ADE9-11F898BA6085}" dt="2021-08-15T21:45:10.854" v="0"/>
+            <ac:spMkLst>
+              <pc:docMk/>
+              <pc:sldMasterMk cId="3777914966" sldId="2147483648"/>
+              <pc:sldLayoutMk cId="2997959970" sldId="2147483659"/>
+              <ac:spMk id="2" creationId="{5D53BF31-DEE0-479B-BCE8-1DB62A611034}"/>
+            </ac:spMkLst>
+          </pc:spChg>
+          <pc:spChg chg="mod">
+            <ac:chgData name="Peter McGinty" userId="138e04b35f3df159" providerId="LiveId" clId="{58769E37-A9B1-4E9A-ADE9-11F898BA6085}" dt="2021-08-15T21:45:10.854" v="0"/>
+            <ac:spMkLst>
+              <pc:docMk/>
+              <pc:sldMasterMk cId="3777914966" sldId="2147483648"/>
+              <pc:sldLayoutMk cId="2997959970" sldId="2147483659"/>
+              <ac:spMk id="3" creationId="{B223A274-60B8-4E5E-AA71-A5CC4E49BBFB}"/>
+            </ac:spMkLst>
+          </pc:spChg>
+        </pc:sldLayoutChg>
+      </pc:sldMasterChg>
+    </pc:docChg>
+  </pc:docChgLst>
+  <pc:docChgLst>
+    <pc:chgData name="Peter McGinty" userId="138e04b35f3df159" providerId="LiveId" clId="{CC732293-7059-5E4E-BD85-651F87A7A2FF}"/>
+    <pc:docChg chg="custSel modSld modSection">
+      <pc:chgData name="Peter McGinty" userId="138e04b35f3df159" providerId="LiveId" clId="{CC732293-7059-5E4E-BD85-651F87A7A2FF}" dt="2021-08-16T05:35:50.756" v="26" actId="17846"/>
+      <pc:docMkLst>
+        <pc:docMk/>
+      </pc:docMkLst>
+      <pc:sldChg chg="modSp mod">
+        <pc:chgData name="Peter McGinty" userId="138e04b35f3df159" providerId="LiveId" clId="{CC732293-7059-5E4E-BD85-651F87A7A2FF}" dt="2021-08-16T05:34:47.539" v="25"/>
+        <pc:sldMkLst>
+          <pc:docMk/>
+          <pc:sldMk cId="14562698" sldId="263"/>
+        </pc:sldMkLst>
+        <pc:spChg chg="mod">
+          <ac:chgData name="Peter McGinty" userId="138e04b35f3df159" providerId="LiveId" clId="{CC732293-7059-5E4E-BD85-651F87A7A2FF}" dt="2021-08-16T05:34:47.539" v="25"/>
+          <ac:spMkLst>
+            <pc:docMk/>
+            <pc:sldMk cId="14562698" sldId="263"/>
+            <ac:spMk id="2" creationId="{C9C54F27-F54E-40C1-AB86-2A9850D04493}"/>
+          </ac:spMkLst>
+        </pc:spChg>
+      </pc:sldChg>
+    </pc:docChg>
+  </pc:docChgLst>
+  <pc:docChgLst>
+    <pc:chgData name="Peter McGinty" userId="138e04b35f3df159" providerId="LiveId" clId="{B4247C41-06B2-4F78-B774-55EDA9C86B32}"/>
+    <pc:docChg chg="modSld modNotesMaster">
+      <pc:chgData name="Peter McGinty" userId="138e04b35f3df159" providerId="LiveId" clId="{B4247C41-06B2-4F78-B774-55EDA9C86B32}" dt="2022-06-02T09:47:33.034" v="1"/>
+      <pc:docMkLst>
+        <pc:docMk/>
+      </pc:docMkLst>
+      <pc:sldChg chg="modNotes">
+        <pc:chgData name="Peter McGinty" userId="138e04b35f3df159" providerId="LiveId" clId="{B4247C41-06B2-4F78-B774-55EDA9C86B32}" dt="2022-06-02T09:47:33.034" v="1"/>
+        <pc:sldMkLst>
+          <pc:docMk/>
+          <pc:sldMk cId="3885251694" sldId="284"/>
+        </pc:sldMkLst>
+      </pc:sldChg>
+      <pc:sldChg chg="modNotes">
+        <pc:chgData name="Peter McGinty" userId="138e04b35f3df159" providerId="LiveId" clId="{B4247C41-06B2-4F78-B774-55EDA9C86B32}" dt="2022-06-02T09:47:33.034" v="1"/>
+        <pc:sldMkLst>
+          <pc:docMk/>
+          <pc:sldMk cId="471948452" sldId="301"/>
+        </pc:sldMkLst>
+      </pc:sldChg>
+      <pc:sldChg chg="modNotes">
+        <pc:chgData name="Peter McGinty" userId="138e04b35f3df159" providerId="LiveId" clId="{B4247C41-06B2-4F78-B774-55EDA9C86B32}" dt="2022-06-02T09:47:33.034" v="1"/>
+        <pc:sldMkLst>
+          <pc:docMk/>
+          <pc:sldMk cId="2011169441" sldId="303"/>
+        </pc:sldMkLst>
+      </pc:sldChg>
+    </pc:docChg>
+  </pc:docChgLst>
   <pc:docChgLst>
     <pc:chgData name="Peter McGinty" userId="138e04b35f3df159" providerId="LiveId" clId="{DC335524-57A0-4E8E-A1DE-062F63E53802}"/>
     <pc:docChg chg="undo custSel addSld delSld modSld sldOrd delSection modSection">
@@ -1696,30 +2655,6 @@
           </pc:sldLayoutMkLst>
         </pc:sldLayoutChg>
       </pc:sldMasterChg>
-    </pc:docChg>
-  </pc:docChgLst>
-  <pc:docChgLst>
-    <pc:chgData name="Peter McGinty" userId="138e04b35f3df159" providerId="LiveId" clId="{CC732293-7059-5E4E-BD85-651F87A7A2FF}"/>
-    <pc:docChg chg="custSel modSld modSection">
-      <pc:chgData name="Peter McGinty" userId="138e04b35f3df159" providerId="LiveId" clId="{CC732293-7059-5E4E-BD85-651F87A7A2FF}" dt="2021-08-16T05:35:50.756" v="26" actId="17846"/>
-      <pc:docMkLst>
-        <pc:docMk/>
-      </pc:docMkLst>
-      <pc:sldChg chg="modSp mod">
-        <pc:chgData name="Peter McGinty" userId="138e04b35f3df159" providerId="LiveId" clId="{CC732293-7059-5E4E-BD85-651F87A7A2FF}" dt="2021-08-16T05:34:47.539" v="25"/>
-        <pc:sldMkLst>
-          <pc:docMk/>
-          <pc:sldMk cId="14562698" sldId="263"/>
-        </pc:sldMkLst>
-        <pc:spChg chg="mod">
-          <ac:chgData name="Peter McGinty" userId="138e04b35f3df159" providerId="LiveId" clId="{CC732293-7059-5E4E-BD85-651F87A7A2FF}" dt="2021-08-16T05:34:47.539" v="25"/>
-          <ac:spMkLst>
-            <pc:docMk/>
-            <pc:sldMk cId="14562698" sldId="263"/>
-            <ac:spMk id="2" creationId="{C9C54F27-F54E-40C1-AB86-2A9850D04493}"/>
-          </ac:spMkLst>
-        </pc:spChg>
-      </pc:sldChg>
     </pc:docChg>
   </pc:docChgLst>
   <pc:docChgLst>
@@ -5047,911 +5982,6 @@
       </pc:sldMasterChg>
     </pc:docChg>
   </pc:docChgLst>
-  <pc:docChgLst>
-    <pc:chgData name="Peter McGinty" userId="138e04b35f3df159" providerId="LiveId" clId="{58769E37-A9B1-4E9A-ADE9-11F898BA6085}"/>
-    <pc:docChg chg="undo custSel addSld delSld modSld sldOrd modMainMaster addSection delSection modSection">
-      <pc:chgData name="Peter McGinty" userId="138e04b35f3df159" providerId="LiveId" clId="{58769E37-A9B1-4E9A-ADE9-11F898BA6085}" dt="2021-08-16T23:08:20.909" v="2049" actId="20577"/>
-      <pc:docMkLst>
-        <pc:docMk/>
-      </pc:docMkLst>
-      <pc:sldChg chg="addSp delSp modSp add mod modClrScheme chgLayout">
-        <pc:chgData name="Peter McGinty" userId="138e04b35f3df159" providerId="LiveId" clId="{58769E37-A9B1-4E9A-ADE9-11F898BA6085}" dt="2021-08-15T22:39:40.929" v="475" actId="20577"/>
-        <pc:sldMkLst>
-          <pc:docMk/>
-          <pc:sldMk cId="3743528606" sldId="256"/>
-        </pc:sldMkLst>
-        <pc:spChg chg="mod ord">
-          <ac:chgData name="Peter McGinty" userId="138e04b35f3df159" providerId="LiveId" clId="{58769E37-A9B1-4E9A-ADE9-11F898BA6085}" dt="2021-08-15T22:12:12.743" v="407" actId="700"/>
-          <ac:spMkLst>
-            <pc:docMk/>
-            <pc:sldMk cId="3743528606" sldId="256"/>
-            <ac:spMk id="2" creationId="{02FEE16B-71B8-43A1-BC00-7A908FE032E6}"/>
-          </ac:spMkLst>
-        </pc:spChg>
-        <pc:spChg chg="del mod ord">
-          <ac:chgData name="Peter McGinty" userId="138e04b35f3df159" providerId="LiveId" clId="{58769E37-A9B1-4E9A-ADE9-11F898BA6085}" dt="2021-08-15T22:12:12.743" v="407" actId="700"/>
-          <ac:spMkLst>
-            <pc:docMk/>
-            <pc:sldMk cId="3743528606" sldId="256"/>
-            <ac:spMk id="3" creationId="{B6C64D23-63A6-4F9E-8173-27ECF12FF6DD}"/>
-          </ac:spMkLst>
-        </pc:spChg>
-        <pc:spChg chg="add mod ord">
-          <ac:chgData name="Peter McGinty" userId="138e04b35f3df159" providerId="LiveId" clId="{58769E37-A9B1-4E9A-ADE9-11F898BA6085}" dt="2021-08-15T22:39:40.929" v="475" actId="20577"/>
-          <ac:spMkLst>
-            <pc:docMk/>
-            <pc:sldMk cId="3743528606" sldId="256"/>
-            <ac:spMk id="4" creationId="{C0DDB592-654E-448B-8AC2-092C2701D126}"/>
-          </ac:spMkLst>
-        </pc:spChg>
-      </pc:sldChg>
-      <pc:sldChg chg="addSp delSp modSp add mod modClrScheme chgLayout">
-        <pc:chgData name="Peter McGinty" userId="138e04b35f3df159" providerId="LiveId" clId="{58769E37-A9B1-4E9A-ADE9-11F898BA6085}" dt="2021-08-16T14:44:53.082" v="1537" actId="20577"/>
-        <pc:sldMkLst>
-          <pc:docMk/>
-          <pc:sldMk cId="697685717" sldId="257"/>
-        </pc:sldMkLst>
-        <pc:spChg chg="mod ord">
-          <ac:chgData name="Peter McGinty" userId="138e04b35f3df159" providerId="LiveId" clId="{58769E37-A9B1-4E9A-ADE9-11F898BA6085}" dt="2021-08-16T14:44:53.082" v="1537" actId="20577"/>
-          <ac:spMkLst>
-            <pc:docMk/>
-            <pc:sldMk cId="697685717" sldId="257"/>
-            <ac:spMk id="2" creationId="{28932AB5-BD43-4ADD-BD4D-A5FC99A6C59D}"/>
-          </ac:spMkLst>
-        </pc:spChg>
-        <pc:spChg chg="del mod ord">
-          <ac:chgData name="Peter McGinty" userId="138e04b35f3df159" providerId="LiveId" clId="{58769E37-A9B1-4E9A-ADE9-11F898BA6085}" dt="2021-08-15T22:39:17.256" v="439" actId="700"/>
-          <ac:spMkLst>
-            <pc:docMk/>
-            <pc:sldMk cId="697685717" sldId="257"/>
-            <ac:spMk id="3" creationId="{E46D7266-05CF-4C8B-AE05-490F2ED66CDE}"/>
-          </ac:spMkLst>
-        </pc:spChg>
-        <pc:spChg chg="add mod ord">
-          <ac:chgData name="Peter McGinty" userId="138e04b35f3df159" providerId="LiveId" clId="{58769E37-A9B1-4E9A-ADE9-11F898BA6085}" dt="2021-08-15T23:36:38.415" v="1198" actId="20577"/>
-          <ac:spMkLst>
-            <pc:docMk/>
-            <pc:sldMk cId="697685717" sldId="257"/>
-            <ac:spMk id="4" creationId="{1E31C777-EF67-48C4-815B-E932275CFDA6}"/>
-          </ac:spMkLst>
-        </pc:spChg>
-      </pc:sldChg>
-      <pc:sldChg chg="addSp delSp modSp add mod">
-        <pc:chgData name="Peter McGinty" userId="138e04b35f3df159" providerId="LiveId" clId="{58769E37-A9B1-4E9A-ADE9-11F898BA6085}" dt="2021-08-16T23:07:42.887" v="2031" actId="478"/>
-        <pc:sldMkLst>
-          <pc:docMk/>
-          <pc:sldMk cId="1152165044" sldId="258"/>
-        </pc:sldMkLst>
-        <pc:spChg chg="mod">
-          <ac:chgData name="Peter McGinty" userId="138e04b35f3df159" providerId="LiveId" clId="{58769E37-A9B1-4E9A-ADE9-11F898BA6085}" dt="2021-08-15T21:52:39.929" v="7" actId="20577"/>
-          <ac:spMkLst>
-            <pc:docMk/>
-            <pc:sldMk cId="1152165044" sldId="258"/>
-            <ac:spMk id="2" creationId="{8E184D61-12EB-4E24-8458-B11B38FAA072}"/>
-          </ac:spMkLst>
-        </pc:spChg>
-        <pc:spChg chg="mod">
-          <ac:chgData name="Peter McGinty" userId="138e04b35f3df159" providerId="LiveId" clId="{58769E37-A9B1-4E9A-ADE9-11F898BA6085}" dt="2021-08-16T22:58:11.906" v="2018" actId="20577"/>
-          <ac:spMkLst>
-            <pc:docMk/>
-            <pc:sldMk cId="1152165044" sldId="258"/>
-            <ac:spMk id="3" creationId="{6F3FF9D2-DA03-438D-8DAD-3180335EB864}"/>
-          </ac:spMkLst>
-        </pc:spChg>
-        <pc:picChg chg="add del mod">
-          <ac:chgData name="Peter McGinty" userId="138e04b35f3df159" providerId="LiveId" clId="{58769E37-A9B1-4E9A-ADE9-11F898BA6085}" dt="2021-08-16T23:07:42.887" v="2031" actId="478"/>
-          <ac:picMkLst>
-            <pc:docMk/>
-            <pc:sldMk cId="1152165044" sldId="258"/>
-            <ac:picMk id="4" creationId="{0422AF40-A508-4616-B75B-7484C55B27DA}"/>
-          </ac:picMkLst>
-        </pc:picChg>
-        <pc:picChg chg="add mod">
-          <ac:chgData name="Peter McGinty" userId="138e04b35f3df159" providerId="LiveId" clId="{58769E37-A9B1-4E9A-ADE9-11F898BA6085}" dt="2021-08-16T23:07:41.337" v="2029" actId="1076"/>
-          <ac:picMkLst>
-            <pc:docMk/>
-            <pc:sldMk cId="1152165044" sldId="258"/>
-            <ac:picMk id="5" creationId="{92FFFDDB-DFBB-41AF-AB20-9D91CAB121C1}"/>
-          </ac:picMkLst>
-        </pc:picChg>
-        <pc:picChg chg="add del mod">
-          <ac:chgData name="Peter McGinty" userId="138e04b35f3df159" providerId="LiveId" clId="{58769E37-A9B1-4E9A-ADE9-11F898BA6085}" dt="2021-08-16T23:07:36.973" v="2028" actId="478"/>
-          <ac:picMkLst>
-            <pc:docMk/>
-            <pc:sldMk cId="1152165044" sldId="258"/>
-            <ac:picMk id="6" creationId="{C7703BC3-ED7E-493C-AD32-FDE18C8F7978}"/>
-          </ac:picMkLst>
-        </pc:picChg>
-      </pc:sldChg>
-      <pc:sldChg chg="addSp modSp add mod modClrScheme modAnim chgLayout">
-        <pc:chgData name="Peter McGinty" userId="138e04b35f3df159" providerId="LiveId" clId="{58769E37-A9B1-4E9A-ADE9-11F898BA6085}" dt="2021-08-16T22:56:15.318" v="2001" actId="21"/>
-        <pc:sldMkLst>
-          <pc:docMk/>
-          <pc:sldMk cId="2418505398" sldId="259"/>
-        </pc:sldMkLst>
-        <pc:spChg chg="mod ord">
-          <ac:chgData name="Peter McGinty" userId="138e04b35f3df159" providerId="LiveId" clId="{58769E37-A9B1-4E9A-ADE9-11F898BA6085}" dt="2021-08-15T22:04:37.245" v="358" actId="700"/>
-          <ac:spMkLst>
-            <pc:docMk/>
-            <pc:sldMk cId="2418505398" sldId="259"/>
-            <ac:spMk id="2" creationId="{A79306C3-5AF3-47CE-BD27-C2B769C26101}"/>
-          </ac:spMkLst>
-        </pc:spChg>
-        <pc:spChg chg="mod ord">
-          <ac:chgData name="Peter McGinty" userId="138e04b35f3df159" providerId="LiveId" clId="{58769E37-A9B1-4E9A-ADE9-11F898BA6085}" dt="2021-08-16T22:56:02.518" v="1999" actId="27636"/>
-          <ac:spMkLst>
-            <pc:docMk/>
-            <pc:sldMk cId="2418505398" sldId="259"/>
-            <ac:spMk id="3" creationId="{E4BF0B8F-A6C2-4140-A654-4A1CEEF2E8FB}"/>
-          </ac:spMkLst>
-        </pc:spChg>
-        <pc:spChg chg="add mod ord">
-          <ac:chgData name="Peter McGinty" userId="138e04b35f3df159" providerId="LiveId" clId="{58769E37-A9B1-4E9A-ADE9-11F898BA6085}" dt="2021-08-16T22:56:15.318" v="2001" actId="21"/>
-          <ac:spMkLst>
-            <pc:docMk/>
-            <pc:sldMk cId="2418505398" sldId="259"/>
-            <ac:spMk id="4" creationId="{57075649-FADE-4755-BEF1-1370FB40D005}"/>
-          </ac:spMkLst>
-        </pc:spChg>
-      </pc:sldChg>
-      <pc:sldChg chg="addSp delSp modSp add mod modClrScheme chgLayout">
-        <pc:chgData name="Peter McGinty" userId="138e04b35f3df159" providerId="LiveId" clId="{58769E37-A9B1-4E9A-ADE9-11F898BA6085}" dt="2021-08-16T23:08:20.909" v="2049" actId="20577"/>
-        <pc:sldMkLst>
-          <pc:docMk/>
-          <pc:sldMk cId="3652514884" sldId="260"/>
-        </pc:sldMkLst>
-        <pc:spChg chg="mod ord">
-          <ac:chgData name="Peter McGinty" userId="138e04b35f3df159" providerId="LiveId" clId="{58769E37-A9B1-4E9A-ADE9-11F898BA6085}" dt="2021-08-16T15:07:14.421" v="1858" actId="700"/>
-          <ac:spMkLst>
-            <pc:docMk/>
-            <pc:sldMk cId="3652514884" sldId="260"/>
-            <ac:spMk id="2" creationId="{F72245F1-A625-4B21-B541-2F3ADA5C2588}"/>
-          </ac:spMkLst>
-        </pc:spChg>
-        <pc:spChg chg="del mod ord">
-          <ac:chgData name="Peter McGinty" userId="138e04b35f3df159" providerId="LiveId" clId="{58769E37-A9B1-4E9A-ADE9-11F898BA6085}" dt="2021-08-16T15:02:54.906" v="1848" actId="478"/>
-          <ac:spMkLst>
-            <pc:docMk/>
-            <pc:sldMk cId="3652514884" sldId="260"/>
-            <ac:spMk id="3" creationId="{F1F94A89-B7A1-4C2E-AEF7-DE9C9068B11B}"/>
-          </ac:spMkLst>
-        </pc:spChg>
-        <pc:spChg chg="add mod ord">
-          <ac:chgData name="Peter McGinty" userId="138e04b35f3df159" providerId="LiveId" clId="{58769E37-A9B1-4E9A-ADE9-11F898BA6085}" dt="2021-08-16T15:07:43.471" v="1863"/>
-          <ac:spMkLst>
-            <pc:docMk/>
-            <pc:sldMk cId="3652514884" sldId="260"/>
-            <ac:spMk id="4" creationId="{84E7AE25-ED64-4986-B2D8-91404B900FE1}"/>
-          </ac:spMkLst>
-        </pc:spChg>
-        <pc:spChg chg="add del mod ord">
-          <ac:chgData name="Peter McGinty" userId="138e04b35f3df159" providerId="LiveId" clId="{58769E37-A9B1-4E9A-ADE9-11F898BA6085}" dt="2021-08-16T15:02:52.040" v="1847" actId="478"/>
-          <ac:spMkLst>
-            <pc:docMk/>
-            <pc:sldMk cId="3652514884" sldId="260"/>
-            <ac:spMk id="5" creationId="{AEEED897-D5C2-4F17-98BC-077B835352B4}"/>
-          </ac:spMkLst>
-        </pc:spChg>
-        <pc:spChg chg="add del mod ord">
-          <ac:chgData name="Peter McGinty" userId="138e04b35f3df159" providerId="LiveId" clId="{58769E37-A9B1-4E9A-ADE9-11F898BA6085}" dt="2021-08-16T15:02:28.203" v="1825" actId="700"/>
-          <ac:spMkLst>
-            <pc:docMk/>
-            <pc:sldMk cId="3652514884" sldId="260"/>
-            <ac:spMk id="6" creationId="{85009A62-A695-4A52-AC24-9134B299F4E3}"/>
-          </ac:spMkLst>
-        </pc:spChg>
-        <pc:spChg chg="add del mod">
-          <ac:chgData name="Peter McGinty" userId="138e04b35f3df159" providerId="LiveId" clId="{58769E37-A9B1-4E9A-ADE9-11F898BA6085}" dt="2021-08-16T15:02:57.952" v="1849" actId="478"/>
-          <ac:spMkLst>
-            <pc:docMk/>
-            <pc:sldMk cId="3652514884" sldId="260"/>
-            <ac:spMk id="10" creationId="{7138F621-3D14-44DC-B53B-348CD2C347F8}"/>
-          </ac:spMkLst>
-        </pc:spChg>
-        <pc:spChg chg="add del mod">
-          <ac:chgData name="Peter McGinty" userId="138e04b35f3df159" providerId="LiveId" clId="{58769E37-A9B1-4E9A-ADE9-11F898BA6085}" dt="2021-08-16T15:07:10.802" v="1857" actId="6264"/>
-          <ac:spMkLst>
-            <pc:docMk/>
-            <pc:sldMk cId="3652514884" sldId="260"/>
-            <ac:spMk id="11" creationId="{62BE7FED-4C93-466F-8A1A-E605367A36CC}"/>
-          </ac:spMkLst>
-        </pc:spChg>
-        <pc:spChg chg="add del mod">
-          <ac:chgData name="Peter McGinty" userId="138e04b35f3df159" providerId="LiveId" clId="{58769E37-A9B1-4E9A-ADE9-11F898BA6085}" dt="2021-08-16T15:07:10.802" v="1857" actId="6264"/>
-          <ac:spMkLst>
-            <pc:docMk/>
-            <pc:sldMk cId="3652514884" sldId="260"/>
-            <ac:spMk id="12" creationId="{B409A966-B0D4-4A62-B11B-D4C0A96E1D5D}"/>
-          </ac:spMkLst>
-        </pc:spChg>
-        <pc:spChg chg="add del mod ord">
-          <ac:chgData name="Peter McGinty" userId="138e04b35f3df159" providerId="LiveId" clId="{58769E37-A9B1-4E9A-ADE9-11F898BA6085}" dt="2021-08-16T15:07:14.421" v="1858" actId="700"/>
-          <ac:spMkLst>
-            <pc:docMk/>
-            <pc:sldMk cId="3652514884" sldId="260"/>
-            <ac:spMk id="13" creationId="{6EBE4623-FD2E-4358-8291-9F24EDF8192B}"/>
-          </ac:spMkLst>
-        </pc:spChg>
-        <pc:spChg chg="add mod ord">
-          <ac:chgData name="Peter McGinty" userId="138e04b35f3df159" providerId="LiveId" clId="{58769E37-A9B1-4E9A-ADE9-11F898BA6085}" dt="2021-08-16T15:07:29.846" v="1861" actId="20578"/>
-          <ac:spMkLst>
-            <pc:docMk/>
-            <pc:sldMk cId="3652514884" sldId="260"/>
-            <ac:spMk id="14" creationId="{4050B917-0B2A-4336-A0D1-5B1EDEAAE6E2}"/>
-          </ac:spMkLst>
-        </pc:spChg>
-        <pc:spChg chg="add mod ord">
-          <ac:chgData name="Peter McGinty" userId="138e04b35f3df159" providerId="LiveId" clId="{58769E37-A9B1-4E9A-ADE9-11F898BA6085}" dt="2021-08-16T23:08:20.909" v="2049" actId="20577"/>
-          <ac:spMkLst>
-            <pc:docMk/>
-            <pc:sldMk cId="3652514884" sldId="260"/>
-            <ac:spMk id="15" creationId="{EE87C03F-AED1-40F9-AFE2-A926E147DB4D}"/>
-          </ac:spMkLst>
-        </pc:spChg>
-        <pc:spChg chg="add mod ord">
-          <ac:chgData name="Peter McGinty" userId="138e04b35f3df159" providerId="LiveId" clId="{58769E37-A9B1-4E9A-ADE9-11F898BA6085}" dt="2021-08-16T15:07:50.520" v="1865"/>
-          <ac:spMkLst>
-            <pc:docMk/>
-            <pc:sldMk cId="3652514884" sldId="260"/>
-            <ac:spMk id="16" creationId="{B36D811B-FA72-454D-907A-880F48144E9B}"/>
-          </ac:spMkLst>
-        </pc:spChg>
-        <pc:picChg chg="add del mod">
-          <ac:chgData name="Peter McGinty" userId="138e04b35f3df159" providerId="LiveId" clId="{58769E37-A9B1-4E9A-ADE9-11F898BA6085}" dt="2021-08-16T15:07:05.192" v="1856" actId="478"/>
-          <ac:picMkLst>
-            <pc:docMk/>
-            <pc:sldMk cId="3652514884" sldId="260"/>
-            <ac:picMk id="8" creationId="{F527445F-954D-4901-A14B-22FE9CCB91AB}"/>
-          </ac:picMkLst>
-        </pc:picChg>
-      </pc:sldChg>
-      <pc:sldChg chg="add">
-        <pc:chgData name="Peter McGinty" userId="138e04b35f3df159" providerId="LiveId" clId="{58769E37-A9B1-4E9A-ADE9-11F898BA6085}" dt="2021-08-15T21:52:10.190" v="1"/>
-        <pc:sldMkLst>
-          <pc:docMk/>
-          <pc:sldMk cId="1360403215" sldId="261"/>
-        </pc:sldMkLst>
-      </pc:sldChg>
-      <pc:sldChg chg="modSp add mod ord">
-        <pc:chgData name="Peter McGinty" userId="138e04b35f3df159" providerId="LiveId" clId="{58769E37-A9B1-4E9A-ADE9-11F898BA6085}" dt="2021-08-15T22:50:34.792" v="643"/>
-        <pc:sldMkLst>
-          <pc:docMk/>
-          <pc:sldMk cId="4244487520" sldId="262"/>
-        </pc:sldMkLst>
-        <pc:spChg chg="mod">
-          <ac:chgData name="Peter McGinty" userId="138e04b35f3df159" providerId="LiveId" clId="{58769E37-A9B1-4E9A-ADE9-11F898BA6085}" dt="2021-08-15T22:49:39.816" v="639" actId="20577"/>
-          <ac:spMkLst>
-            <pc:docMk/>
-            <pc:sldMk cId="4244487520" sldId="262"/>
-            <ac:spMk id="2" creationId="{BB8CD0D0-2942-44EC-AC61-52BE97AF7F93}"/>
-          </ac:spMkLst>
-        </pc:spChg>
-      </pc:sldChg>
-      <pc:sldChg chg="addSp delSp modSp add mod modClrScheme chgLayout">
-        <pc:chgData name="Peter McGinty" userId="138e04b35f3df159" providerId="LiveId" clId="{58769E37-A9B1-4E9A-ADE9-11F898BA6085}" dt="2021-08-16T14:53:25.444" v="1607" actId="20577"/>
-        <pc:sldMkLst>
-          <pc:docMk/>
-          <pc:sldMk cId="14562698" sldId="263"/>
-        </pc:sldMkLst>
-        <pc:spChg chg="mod ord">
-          <ac:chgData name="Peter McGinty" userId="138e04b35f3df159" providerId="LiveId" clId="{58769E37-A9B1-4E9A-ADE9-11F898BA6085}" dt="2021-08-16T14:53:25.444" v="1607" actId="20577"/>
-          <ac:spMkLst>
-            <pc:docMk/>
-            <pc:sldMk cId="14562698" sldId="263"/>
-            <ac:spMk id="2" creationId="{C9C54F27-F54E-40C1-AB86-2A9850D04493}"/>
-          </ac:spMkLst>
-        </pc:spChg>
-        <pc:spChg chg="del mod ord">
-          <ac:chgData name="Peter McGinty" userId="138e04b35f3df159" providerId="LiveId" clId="{58769E37-A9B1-4E9A-ADE9-11F898BA6085}" dt="2021-08-15T23:39:25.952" v="1231" actId="700"/>
-          <ac:spMkLst>
-            <pc:docMk/>
-            <pc:sldMk cId="14562698" sldId="263"/>
-            <ac:spMk id="3" creationId="{AC9424D8-954E-4459-9A38-953926F71CA4}"/>
-          </ac:spMkLst>
-        </pc:spChg>
-        <pc:spChg chg="add mod ord">
-          <ac:chgData name="Peter McGinty" userId="138e04b35f3df159" providerId="LiveId" clId="{58769E37-A9B1-4E9A-ADE9-11F898BA6085}" dt="2021-08-15T23:39:25.952" v="1231" actId="700"/>
-          <ac:spMkLst>
-            <pc:docMk/>
-            <pc:sldMk cId="14562698" sldId="263"/>
-            <ac:spMk id="4" creationId="{BE89B0F9-5A23-4726-A706-3C543D4C52E9}"/>
-          </ac:spMkLst>
-        </pc:spChg>
-      </pc:sldChg>
-      <pc:sldChg chg="addSp delSp modSp add mod ord modClrScheme chgLayout">
-        <pc:chgData name="Peter McGinty" userId="138e04b35f3df159" providerId="LiveId" clId="{58769E37-A9B1-4E9A-ADE9-11F898BA6085}" dt="2021-08-16T15:15:34.431" v="1914" actId="20577"/>
-        <pc:sldMkLst>
-          <pc:docMk/>
-          <pc:sldMk cId="4160896528" sldId="264"/>
-        </pc:sldMkLst>
-        <pc:spChg chg="mod ord">
-          <ac:chgData name="Peter McGinty" userId="138e04b35f3df159" providerId="LiveId" clId="{58769E37-A9B1-4E9A-ADE9-11F898BA6085}" dt="2021-08-16T15:15:34.431" v="1914" actId="20577"/>
-          <ac:spMkLst>
-            <pc:docMk/>
-            <pc:sldMk cId="4160896528" sldId="264"/>
-            <ac:spMk id="2" creationId="{9DCD33BB-CCBF-4A68-B5A8-E56898E28402}"/>
-          </ac:spMkLst>
-        </pc:spChg>
-        <pc:spChg chg="del mod ord">
-          <ac:chgData name="Peter McGinty" userId="138e04b35f3df159" providerId="LiveId" clId="{58769E37-A9B1-4E9A-ADE9-11F898BA6085}" dt="2021-08-16T14:44:17.826" v="1529" actId="700"/>
-          <ac:spMkLst>
-            <pc:docMk/>
-            <pc:sldMk cId="4160896528" sldId="264"/>
-            <ac:spMk id="3" creationId="{F5003DD2-0275-4CAF-BB88-A3461328A364}"/>
-          </ac:spMkLst>
-        </pc:spChg>
-        <pc:spChg chg="add mod ord">
-          <ac:chgData name="Peter McGinty" userId="138e04b35f3df159" providerId="LiveId" clId="{58769E37-A9B1-4E9A-ADE9-11F898BA6085}" dt="2021-08-16T14:44:17.826" v="1529" actId="700"/>
-          <ac:spMkLst>
-            <pc:docMk/>
-            <pc:sldMk cId="4160896528" sldId="264"/>
-            <ac:spMk id="4" creationId="{8CC5D8E0-963C-4257-B69E-4899A3BA9742}"/>
-          </ac:spMkLst>
-        </pc:spChg>
-      </pc:sldChg>
-      <pc:sldChg chg="addSp delSp modSp add mod ord modClrScheme chgLayout">
-        <pc:chgData name="Peter McGinty" userId="138e04b35f3df159" providerId="LiveId" clId="{58769E37-A9B1-4E9A-ADE9-11F898BA6085}" dt="2021-08-16T14:51:57.588" v="1601" actId="20578"/>
-        <pc:sldMkLst>
-          <pc:docMk/>
-          <pc:sldMk cId="1995777251" sldId="265"/>
-        </pc:sldMkLst>
-        <pc:spChg chg="mod ord">
-          <ac:chgData name="Peter McGinty" userId="138e04b35f3df159" providerId="LiveId" clId="{58769E37-A9B1-4E9A-ADE9-11F898BA6085}" dt="2021-08-16T14:49:52.519" v="1600" actId="20577"/>
-          <ac:spMkLst>
-            <pc:docMk/>
-            <pc:sldMk cId="1995777251" sldId="265"/>
-            <ac:spMk id="2" creationId="{D8D0C1E8-68CA-46AC-A961-2BD3C264546C}"/>
-          </ac:spMkLst>
-        </pc:spChg>
-        <pc:spChg chg="del mod ord">
-          <ac:chgData name="Peter McGinty" userId="138e04b35f3df159" providerId="LiveId" clId="{58769E37-A9B1-4E9A-ADE9-11F898BA6085}" dt="2021-08-16T14:41:51.263" v="1492" actId="700"/>
-          <ac:spMkLst>
-            <pc:docMk/>
-            <pc:sldMk cId="1995777251" sldId="265"/>
-            <ac:spMk id="3" creationId="{BC197E4E-EE76-430B-9A82-96EDBB62E427}"/>
-          </ac:spMkLst>
-        </pc:spChg>
-        <pc:spChg chg="add mod ord">
-          <ac:chgData name="Peter McGinty" userId="138e04b35f3df159" providerId="LiveId" clId="{58769E37-A9B1-4E9A-ADE9-11F898BA6085}" dt="2021-08-16T14:41:51.263" v="1492" actId="700"/>
-          <ac:spMkLst>
-            <pc:docMk/>
-            <pc:sldMk cId="1995777251" sldId="265"/>
-            <ac:spMk id="4" creationId="{1A6FD951-C768-4480-B55E-7BD167317413}"/>
-          </ac:spMkLst>
-        </pc:spChg>
-      </pc:sldChg>
-      <pc:sldChg chg="add ord">
-        <pc:chgData name="Peter McGinty" userId="138e04b35f3df159" providerId="LiveId" clId="{58769E37-A9B1-4E9A-ADE9-11F898BA6085}" dt="2021-08-15T22:32:22.416" v="430"/>
-        <pc:sldMkLst>
-          <pc:docMk/>
-          <pc:sldMk cId="3412870619" sldId="266"/>
-        </pc:sldMkLst>
-      </pc:sldChg>
-      <pc:sldChg chg="add">
-        <pc:chgData name="Peter McGinty" userId="138e04b35f3df159" providerId="LiveId" clId="{58769E37-A9B1-4E9A-ADE9-11F898BA6085}" dt="2021-08-15T21:52:10.190" v="1"/>
-        <pc:sldMkLst>
-          <pc:docMk/>
-          <pc:sldMk cId="4133629237" sldId="267"/>
-        </pc:sldMkLst>
-      </pc:sldChg>
-      <pc:sldChg chg="add">
-        <pc:chgData name="Peter McGinty" userId="138e04b35f3df159" providerId="LiveId" clId="{58769E37-A9B1-4E9A-ADE9-11F898BA6085}" dt="2021-08-15T21:52:10.190" v="1"/>
-        <pc:sldMkLst>
-          <pc:docMk/>
-          <pc:sldMk cId="1606028670" sldId="268"/>
-        </pc:sldMkLst>
-      </pc:sldChg>
-      <pc:sldChg chg="add">
-        <pc:chgData name="Peter McGinty" userId="138e04b35f3df159" providerId="LiveId" clId="{58769E37-A9B1-4E9A-ADE9-11F898BA6085}" dt="2021-08-15T21:52:10.190" v="1"/>
-        <pc:sldMkLst>
-          <pc:docMk/>
-          <pc:sldMk cId="1295996578" sldId="269"/>
-        </pc:sldMkLst>
-      </pc:sldChg>
-      <pc:sldChg chg="add">
-        <pc:chgData name="Peter McGinty" userId="138e04b35f3df159" providerId="LiveId" clId="{58769E37-A9B1-4E9A-ADE9-11F898BA6085}" dt="2021-08-15T21:52:10.190" v="1"/>
-        <pc:sldMkLst>
-          <pc:docMk/>
-          <pc:sldMk cId="1580379055" sldId="270"/>
-        </pc:sldMkLst>
-      </pc:sldChg>
-      <pc:sldChg chg="add del">
-        <pc:chgData name="Peter McGinty" userId="138e04b35f3df159" providerId="LiveId" clId="{58769E37-A9B1-4E9A-ADE9-11F898BA6085}" dt="2021-08-15T22:30:59.624" v="423" actId="47"/>
-        <pc:sldMkLst>
-          <pc:docMk/>
-          <pc:sldMk cId="1804999901" sldId="271"/>
-        </pc:sldMkLst>
-      </pc:sldChg>
-      <pc:sldChg chg="addSp delSp modSp add mod ord modClrScheme chgLayout">
-        <pc:chgData name="Peter McGinty" userId="138e04b35f3df159" providerId="LiveId" clId="{58769E37-A9B1-4E9A-ADE9-11F898BA6085}" dt="2021-08-16T14:47:37.050" v="1557" actId="20577"/>
-        <pc:sldMkLst>
-          <pc:docMk/>
-          <pc:sldMk cId="3206573147" sldId="272"/>
-        </pc:sldMkLst>
-        <pc:spChg chg="mod ord">
-          <ac:chgData name="Peter McGinty" userId="138e04b35f3df159" providerId="LiveId" clId="{58769E37-A9B1-4E9A-ADE9-11F898BA6085}" dt="2021-08-16T14:47:37.050" v="1557" actId="20577"/>
-          <ac:spMkLst>
-            <pc:docMk/>
-            <pc:sldMk cId="3206573147" sldId="272"/>
-            <ac:spMk id="2" creationId="{5956761D-5205-4472-8FF3-4BAE85838467}"/>
-          </ac:spMkLst>
-        </pc:spChg>
-        <pc:spChg chg="del mod ord">
-          <ac:chgData name="Peter McGinty" userId="138e04b35f3df159" providerId="LiveId" clId="{58769E37-A9B1-4E9A-ADE9-11F898BA6085}" dt="2021-08-15T23:42:29.140" v="1266" actId="700"/>
-          <ac:spMkLst>
-            <pc:docMk/>
-            <pc:sldMk cId="3206573147" sldId="272"/>
-            <ac:spMk id="3" creationId="{85800ABD-06D3-4E4E-9C3F-1E8C6BB3423E}"/>
-          </ac:spMkLst>
-        </pc:spChg>
-        <pc:spChg chg="add mod ord">
-          <ac:chgData name="Peter McGinty" userId="138e04b35f3df159" providerId="LiveId" clId="{58769E37-A9B1-4E9A-ADE9-11F898BA6085}" dt="2021-08-15T23:42:29.140" v="1266" actId="700"/>
-          <ac:spMkLst>
-            <pc:docMk/>
-            <pc:sldMk cId="3206573147" sldId="272"/>
-            <ac:spMk id="4" creationId="{90D77681-B9BB-4F38-8213-A3693E790B50}"/>
-          </ac:spMkLst>
-        </pc:spChg>
-      </pc:sldChg>
-      <pc:sldChg chg="add">
-        <pc:chgData name="Peter McGinty" userId="138e04b35f3df159" providerId="LiveId" clId="{58769E37-A9B1-4E9A-ADE9-11F898BA6085}" dt="2021-08-15T21:52:10.190" v="1"/>
-        <pc:sldMkLst>
-          <pc:docMk/>
-          <pc:sldMk cId="4139861047" sldId="273"/>
-        </pc:sldMkLst>
-      </pc:sldChg>
-      <pc:sldChg chg="add">
-        <pc:chgData name="Peter McGinty" userId="138e04b35f3df159" providerId="LiveId" clId="{58769E37-A9B1-4E9A-ADE9-11F898BA6085}" dt="2021-08-15T21:52:10.190" v="1"/>
-        <pc:sldMkLst>
-          <pc:docMk/>
-          <pc:sldMk cId="2944802119" sldId="274"/>
-        </pc:sldMkLst>
-      </pc:sldChg>
-      <pc:sldChg chg="add del">
-        <pc:chgData name="Peter McGinty" userId="138e04b35f3df159" providerId="LiveId" clId="{58769E37-A9B1-4E9A-ADE9-11F898BA6085}" dt="2021-08-15T22:30:52.726" v="422" actId="47"/>
-        <pc:sldMkLst>
-          <pc:docMk/>
-          <pc:sldMk cId="1375106812" sldId="275"/>
-        </pc:sldMkLst>
-      </pc:sldChg>
-      <pc:sldChg chg="addSp delSp modSp new mod modClrScheme chgLayout">
-        <pc:chgData name="Peter McGinty" userId="138e04b35f3df159" providerId="LiveId" clId="{58769E37-A9B1-4E9A-ADE9-11F898BA6085}" dt="2021-08-16T14:13:50.683" v="1409" actId="700"/>
-        <pc:sldMkLst>
-          <pc:docMk/>
-          <pc:sldMk cId="2171811396" sldId="275"/>
-        </pc:sldMkLst>
-        <pc:spChg chg="mod ord">
-          <ac:chgData name="Peter McGinty" userId="138e04b35f3df159" providerId="LiveId" clId="{58769E37-A9B1-4E9A-ADE9-11F898BA6085}" dt="2021-08-16T14:13:50.683" v="1409" actId="700"/>
-          <ac:spMkLst>
-            <pc:docMk/>
-            <pc:sldMk cId="2171811396" sldId="275"/>
-            <ac:spMk id="2" creationId="{802F810C-22A0-456D-A9D8-92E244F8B0C5}"/>
-          </ac:spMkLst>
-        </pc:spChg>
-        <pc:spChg chg="del mod ord">
-          <ac:chgData name="Peter McGinty" userId="138e04b35f3df159" providerId="LiveId" clId="{58769E37-A9B1-4E9A-ADE9-11F898BA6085}" dt="2021-08-16T14:13:50.683" v="1409" actId="700"/>
-          <ac:spMkLst>
-            <pc:docMk/>
-            <pc:sldMk cId="2171811396" sldId="275"/>
-            <ac:spMk id="3" creationId="{EA1D4C28-25A0-4E4E-8E13-75124C5A5347}"/>
-          </ac:spMkLst>
-        </pc:spChg>
-        <pc:spChg chg="add mod ord">
-          <ac:chgData name="Peter McGinty" userId="138e04b35f3df159" providerId="LiveId" clId="{58769E37-A9B1-4E9A-ADE9-11F898BA6085}" dt="2021-08-16T14:13:50.683" v="1409" actId="700"/>
-          <ac:spMkLst>
-            <pc:docMk/>
-            <pc:sldMk cId="2171811396" sldId="275"/>
-            <ac:spMk id="4" creationId="{1CF87583-E70B-4E3F-B239-F5BBB9792296}"/>
-          </ac:spMkLst>
-        </pc:spChg>
-        <pc:spChg chg="add mod ord">
-          <ac:chgData name="Peter McGinty" userId="138e04b35f3df159" providerId="LiveId" clId="{58769E37-A9B1-4E9A-ADE9-11F898BA6085}" dt="2021-08-16T14:13:50.683" v="1409" actId="700"/>
-          <ac:spMkLst>
-            <pc:docMk/>
-            <pc:sldMk cId="2171811396" sldId="275"/>
-            <ac:spMk id="5" creationId="{EE589FCE-ED4A-4E7A-8D5E-60037AF2C1EE}"/>
-          </ac:spMkLst>
-        </pc:spChg>
-      </pc:sldChg>
-      <pc:sldChg chg="addSp delSp modSp add mod modClrScheme chgLayout">
-        <pc:chgData name="Peter McGinty" userId="138e04b35f3df159" providerId="LiveId" clId="{58769E37-A9B1-4E9A-ADE9-11F898BA6085}" dt="2021-08-16T15:12:52.854" v="1898" actId="1076"/>
-        <pc:sldMkLst>
-          <pc:docMk/>
-          <pc:sldMk cId="1074021759" sldId="276"/>
-        </pc:sldMkLst>
-        <pc:spChg chg="mod ord">
-          <ac:chgData name="Peter McGinty" userId="138e04b35f3df159" providerId="LiveId" clId="{58769E37-A9B1-4E9A-ADE9-11F898BA6085}" dt="2021-08-16T15:09:10.017" v="1886" actId="6549"/>
-          <ac:spMkLst>
-            <pc:docMk/>
-            <pc:sldMk cId="1074021759" sldId="276"/>
-            <ac:spMk id="2" creationId="{F72245F1-A625-4B21-B541-2F3ADA5C2588}"/>
-          </ac:spMkLst>
-        </pc:spChg>
-        <pc:spChg chg="del">
-          <ac:chgData name="Peter McGinty" userId="138e04b35f3df159" providerId="LiveId" clId="{58769E37-A9B1-4E9A-ADE9-11F898BA6085}" dt="2021-08-16T15:08:36.713" v="1866" actId="478"/>
-          <ac:spMkLst>
-            <pc:docMk/>
-            <pc:sldMk cId="1074021759" sldId="276"/>
-            <ac:spMk id="4" creationId="{84E7AE25-ED64-4986-B2D8-91404B900FE1}"/>
-          </ac:spMkLst>
-        </pc:spChg>
-        <pc:spChg chg="add del mod">
-          <ac:chgData name="Peter McGinty" userId="138e04b35f3df159" providerId="LiveId" clId="{58769E37-A9B1-4E9A-ADE9-11F898BA6085}" dt="2021-08-16T15:08:40.256" v="1867" actId="478"/>
-          <ac:spMkLst>
-            <pc:docMk/>
-            <pc:sldMk cId="1074021759" sldId="276"/>
-            <ac:spMk id="5" creationId="{1F173FAA-3EE4-45B7-AE8E-444D0F1D38A4}"/>
-          </ac:spMkLst>
-        </pc:spChg>
-        <pc:picChg chg="add del mod">
-          <ac:chgData name="Peter McGinty" userId="138e04b35f3df159" providerId="LiveId" clId="{58769E37-A9B1-4E9A-ADE9-11F898BA6085}" dt="2021-08-16T15:12:43.272" v="1893" actId="478"/>
-          <ac:picMkLst>
-            <pc:docMk/>
-            <pc:sldMk cId="1074021759" sldId="276"/>
-            <ac:picMk id="7" creationId="{AECF730D-6771-4FF5-BF8B-8FF63C12D59D}"/>
-          </ac:picMkLst>
-        </pc:picChg>
-        <pc:picChg chg="del mod">
-          <ac:chgData name="Peter McGinty" userId="138e04b35f3df159" providerId="LiveId" clId="{58769E37-A9B1-4E9A-ADE9-11F898BA6085}" dt="2021-08-16T15:12:20.632" v="1889" actId="478"/>
-          <ac:picMkLst>
-            <pc:docMk/>
-            <pc:sldMk cId="1074021759" sldId="276"/>
-            <ac:picMk id="8" creationId="{F527445F-954D-4901-A14B-22FE9CCB91AB}"/>
-          </ac:picMkLst>
-        </pc:picChg>
-        <pc:picChg chg="add mod">
-          <ac:chgData name="Peter McGinty" userId="138e04b35f3df159" providerId="LiveId" clId="{58769E37-A9B1-4E9A-ADE9-11F898BA6085}" dt="2021-08-16T15:12:52.854" v="1898" actId="1076"/>
-          <ac:picMkLst>
-            <pc:docMk/>
-            <pc:sldMk cId="1074021759" sldId="276"/>
-            <ac:picMk id="10" creationId="{DC89D4B3-1184-452C-8D77-8CA84ADC524B}"/>
-          </ac:picMkLst>
-        </pc:picChg>
-      </pc:sldChg>
-      <pc:sldChg chg="new del">
-        <pc:chgData name="Peter McGinty" userId="138e04b35f3df159" providerId="LiveId" clId="{58769E37-A9B1-4E9A-ADE9-11F898BA6085}" dt="2021-08-16T14:47:14.298" v="1548" actId="2696"/>
-        <pc:sldMkLst>
-          <pc:docMk/>
-          <pc:sldMk cId="2571791367" sldId="276"/>
-        </pc:sldMkLst>
-      </pc:sldChg>
-      <pc:sldChg chg="modSp new mod">
-        <pc:chgData name="Peter McGinty" userId="138e04b35f3df159" providerId="LiveId" clId="{58769E37-A9B1-4E9A-ADE9-11F898BA6085}" dt="2021-08-16T15:16:37.375" v="1949" actId="20577"/>
-        <pc:sldMkLst>
-          <pc:docMk/>
-          <pc:sldMk cId="1408481453" sldId="277"/>
-        </pc:sldMkLst>
-        <pc:spChg chg="mod">
-          <ac:chgData name="Peter McGinty" userId="138e04b35f3df159" providerId="LiveId" clId="{58769E37-A9B1-4E9A-ADE9-11F898BA6085}" dt="2021-08-16T15:16:37.375" v="1949" actId="20577"/>
-          <ac:spMkLst>
-            <pc:docMk/>
-            <pc:sldMk cId="1408481453" sldId="277"/>
-            <ac:spMk id="2" creationId="{18F33E80-BFEC-4C94-8618-514A7466C1D0}"/>
-          </ac:spMkLst>
-        </pc:spChg>
-      </pc:sldChg>
-      <pc:sldChg chg="new del">
-        <pc:chgData name="Peter McGinty" userId="138e04b35f3df159" providerId="LiveId" clId="{58769E37-A9B1-4E9A-ADE9-11F898BA6085}" dt="2021-08-16T14:41:09.762" v="1489" actId="2696"/>
-        <pc:sldMkLst>
-          <pc:docMk/>
-          <pc:sldMk cId="4273763004" sldId="277"/>
-        </pc:sldMkLst>
-      </pc:sldChg>
-      <pc:sldChg chg="addSp delSp modSp new mod modClrScheme chgLayout">
-        <pc:chgData name="Peter McGinty" userId="138e04b35f3df159" providerId="LiveId" clId="{58769E37-A9B1-4E9A-ADE9-11F898BA6085}" dt="2021-08-16T15:19:38.831" v="1989" actId="20577"/>
-        <pc:sldMkLst>
-          <pc:docMk/>
-          <pc:sldMk cId="2137941897" sldId="278"/>
-        </pc:sldMkLst>
-        <pc:spChg chg="del mod ord">
-          <ac:chgData name="Peter McGinty" userId="138e04b35f3df159" providerId="LiveId" clId="{58769E37-A9B1-4E9A-ADE9-11F898BA6085}" dt="2021-08-16T15:18:57.415" v="1952" actId="700"/>
-          <ac:spMkLst>
-            <pc:docMk/>
-            <pc:sldMk cId="2137941897" sldId="278"/>
-            <ac:spMk id="2" creationId="{39E85C5B-6871-4D97-818D-CE5D4E239220}"/>
-          </ac:spMkLst>
-        </pc:spChg>
-        <pc:spChg chg="del mod ord">
-          <ac:chgData name="Peter McGinty" userId="138e04b35f3df159" providerId="LiveId" clId="{58769E37-A9B1-4E9A-ADE9-11F898BA6085}" dt="2021-08-16T15:18:57.415" v="1952" actId="700"/>
-          <ac:spMkLst>
-            <pc:docMk/>
-            <pc:sldMk cId="2137941897" sldId="278"/>
-            <ac:spMk id="3" creationId="{72FE0FBE-C0F5-4BB1-B0D5-32C980AF34FA}"/>
-          </ac:spMkLst>
-        </pc:spChg>
-        <pc:spChg chg="add mod ord">
-          <ac:chgData name="Peter McGinty" userId="138e04b35f3df159" providerId="LiveId" clId="{58769E37-A9B1-4E9A-ADE9-11F898BA6085}" dt="2021-08-16T15:19:10.648" v="1958" actId="20577"/>
-          <ac:spMkLst>
-            <pc:docMk/>
-            <pc:sldMk cId="2137941897" sldId="278"/>
-            <ac:spMk id="4" creationId="{6BA38571-1326-4F3F-B358-9CDC3BCF5605}"/>
-          </ac:spMkLst>
-        </pc:spChg>
-        <pc:spChg chg="add mod ord">
-          <ac:chgData name="Peter McGinty" userId="138e04b35f3df159" providerId="LiveId" clId="{58769E37-A9B1-4E9A-ADE9-11F898BA6085}" dt="2021-08-16T15:19:38.831" v="1989" actId="20577"/>
-          <ac:spMkLst>
-            <pc:docMk/>
-            <pc:sldMk cId="2137941897" sldId="278"/>
-            <ac:spMk id="5" creationId="{7C471EE2-A287-4506-8239-9CF76675125F}"/>
-          </ac:spMkLst>
-        </pc:spChg>
-      </pc:sldChg>
-      <pc:sldMasterChg chg="modSp modSldLayout">
-        <pc:chgData name="Peter McGinty" userId="138e04b35f3df159" providerId="LiveId" clId="{58769E37-A9B1-4E9A-ADE9-11F898BA6085}" dt="2021-08-15T21:45:10.854" v="0"/>
-        <pc:sldMasterMkLst>
-          <pc:docMk/>
-          <pc:sldMasterMk cId="3777914966" sldId="2147483648"/>
-        </pc:sldMasterMkLst>
-        <pc:spChg chg="mod">
-          <ac:chgData name="Peter McGinty" userId="138e04b35f3df159" providerId="LiveId" clId="{58769E37-A9B1-4E9A-ADE9-11F898BA6085}" dt="2021-08-15T21:45:10.854" v="0"/>
-          <ac:spMkLst>
-            <pc:docMk/>
-            <pc:sldMasterMk cId="3777914966" sldId="2147483648"/>
-            <ac:spMk id="2" creationId="{472C5935-4AA3-45BD-A2AD-A19F3D04F782}"/>
-          </ac:spMkLst>
-        </pc:spChg>
-        <pc:spChg chg="mod">
-          <ac:chgData name="Peter McGinty" userId="138e04b35f3df159" providerId="LiveId" clId="{58769E37-A9B1-4E9A-ADE9-11F898BA6085}" dt="2021-08-15T21:45:10.854" v="0"/>
-          <ac:spMkLst>
-            <pc:docMk/>
-            <pc:sldMasterMk cId="3777914966" sldId="2147483648"/>
-            <ac:spMk id="3" creationId="{FC25450A-CD2D-4E74-A573-DA1F8F0635E6}"/>
-          </ac:spMkLst>
-        </pc:spChg>
-        <pc:spChg chg="mod">
-          <ac:chgData name="Peter McGinty" userId="138e04b35f3df159" providerId="LiveId" clId="{58769E37-A9B1-4E9A-ADE9-11F898BA6085}" dt="2021-08-15T21:45:10.854" v="0"/>
-          <ac:spMkLst>
-            <pc:docMk/>
-            <pc:sldMasterMk cId="3777914966" sldId="2147483648"/>
-            <ac:spMk id="4" creationId="{33890845-E65D-4A81-93D7-EE1190EDBBEC}"/>
-          </ac:spMkLst>
-        </pc:spChg>
-        <pc:spChg chg="mod">
-          <ac:chgData name="Peter McGinty" userId="138e04b35f3df159" providerId="LiveId" clId="{58769E37-A9B1-4E9A-ADE9-11F898BA6085}" dt="2021-08-15T21:45:10.854" v="0"/>
-          <ac:spMkLst>
-            <pc:docMk/>
-            <pc:sldMasterMk cId="3777914966" sldId="2147483648"/>
-            <ac:spMk id="5" creationId="{62D03B44-A7B0-484F-B05C-B9AA237CBA80}"/>
-          </ac:spMkLst>
-        </pc:spChg>
-        <pc:spChg chg="mod">
-          <ac:chgData name="Peter McGinty" userId="138e04b35f3df159" providerId="LiveId" clId="{58769E37-A9B1-4E9A-ADE9-11F898BA6085}" dt="2021-08-15T21:45:10.854" v="0"/>
-          <ac:spMkLst>
-            <pc:docMk/>
-            <pc:sldMasterMk cId="3777914966" sldId="2147483648"/>
-            <ac:spMk id="6" creationId="{AE7C505C-D9CF-46E7-95CB-088A348A0C13}"/>
-          </ac:spMkLst>
-        </pc:spChg>
-        <pc:sldLayoutChg chg="modSp">
-          <pc:chgData name="Peter McGinty" userId="138e04b35f3df159" providerId="LiveId" clId="{58769E37-A9B1-4E9A-ADE9-11F898BA6085}" dt="2021-08-15T21:45:10.854" v="0"/>
-          <pc:sldLayoutMkLst>
-            <pc:docMk/>
-            <pc:sldMasterMk cId="3777914966" sldId="2147483648"/>
-            <pc:sldLayoutMk cId="2153645582" sldId="2147483649"/>
-          </pc:sldLayoutMkLst>
-          <pc:spChg chg="mod">
-            <ac:chgData name="Peter McGinty" userId="138e04b35f3df159" providerId="LiveId" clId="{58769E37-A9B1-4E9A-ADE9-11F898BA6085}" dt="2021-08-15T21:45:10.854" v="0"/>
-            <ac:spMkLst>
-              <pc:docMk/>
-              <pc:sldMasterMk cId="3777914966" sldId="2147483648"/>
-              <pc:sldLayoutMk cId="2153645582" sldId="2147483649"/>
-              <ac:spMk id="2" creationId="{69EFA8BE-6470-4B77-A0D3-871C890931B7}"/>
-            </ac:spMkLst>
-          </pc:spChg>
-          <pc:spChg chg="mod">
-            <ac:chgData name="Peter McGinty" userId="138e04b35f3df159" providerId="LiveId" clId="{58769E37-A9B1-4E9A-ADE9-11F898BA6085}" dt="2021-08-15T21:45:10.854" v="0"/>
-            <ac:spMkLst>
-              <pc:docMk/>
-              <pc:sldMasterMk cId="3777914966" sldId="2147483648"/>
-              <pc:sldLayoutMk cId="2153645582" sldId="2147483649"/>
-              <ac:spMk id="3" creationId="{2945FA10-0214-426E-BBB6-0E158B1A87E8}"/>
-            </ac:spMkLst>
-          </pc:spChg>
-        </pc:sldLayoutChg>
-        <pc:sldLayoutChg chg="modSp">
-          <pc:chgData name="Peter McGinty" userId="138e04b35f3df159" providerId="LiveId" clId="{58769E37-A9B1-4E9A-ADE9-11F898BA6085}" dt="2021-08-15T21:45:10.854" v="0"/>
-          <pc:sldLayoutMkLst>
-            <pc:docMk/>
-            <pc:sldMasterMk cId="3777914966" sldId="2147483648"/>
-            <pc:sldLayoutMk cId="1749687876" sldId="2147483651"/>
-          </pc:sldLayoutMkLst>
-          <pc:spChg chg="mod">
-            <ac:chgData name="Peter McGinty" userId="138e04b35f3df159" providerId="LiveId" clId="{58769E37-A9B1-4E9A-ADE9-11F898BA6085}" dt="2021-08-15T21:45:10.854" v="0"/>
-            <ac:spMkLst>
-              <pc:docMk/>
-              <pc:sldMasterMk cId="3777914966" sldId="2147483648"/>
-              <pc:sldLayoutMk cId="1749687876" sldId="2147483651"/>
-              <ac:spMk id="2" creationId="{3F52FC24-C454-464A-B791-E4839F046DCA}"/>
-            </ac:spMkLst>
-          </pc:spChg>
-          <pc:spChg chg="mod">
-            <ac:chgData name="Peter McGinty" userId="138e04b35f3df159" providerId="LiveId" clId="{58769E37-A9B1-4E9A-ADE9-11F898BA6085}" dt="2021-08-15T21:45:10.854" v="0"/>
-            <ac:spMkLst>
-              <pc:docMk/>
-              <pc:sldMasterMk cId="3777914966" sldId="2147483648"/>
-              <pc:sldLayoutMk cId="1749687876" sldId="2147483651"/>
-              <ac:spMk id="3" creationId="{089BB5F9-DCEA-4195-8761-5A17B008EA60}"/>
-            </ac:spMkLst>
-          </pc:spChg>
-        </pc:sldLayoutChg>
-        <pc:sldLayoutChg chg="modSp">
-          <pc:chgData name="Peter McGinty" userId="138e04b35f3df159" providerId="LiveId" clId="{58769E37-A9B1-4E9A-ADE9-11F898BA6085}" dt="2021-08-15T21:45:10.854" v="0"/>
-          <pc:sldLayoutMkLst>
-            <pc:docMk/>
-            <pc:sldMasterMk cId="3777914966" sldId="2147483648"/>
-            <pc:sldLayoutMk cId="3884811684" sldId="2147483652"/>
-          </pc:sldLayoutMkLst>
-          <pc:spChg chg="mod">
-            <ac:chgData name="Peter McGinty" userId="138e04b35f3df159" providerId="LiveId" clId="{58769E37-A9B1-4E9A-ADE9-11F898BA6085}" dt="2021-08-15T21:45:10.854" v="0"/>
-            <ac:spMkLst>
-              <pc:docMk/>
-              <pc:sldMasterMk cId="3777914966" sldId="2147483648"/>
-              <pc:sldLayoutMk cId="3884811684" sldId="2147483652"/>
-              <ac:spMk id="3" creationId="{0DA6672F-9990-4093-8E59-3A712973549A}"/>
-            </ac:spMkLst>
-          </pc:spChg>
-          <pc:spChg chg="mod">
-            <ac:chgData name="Peter McGinty" userId="138e04b35f3df159" providerId="LiveId" clId="{58769E37-A9B1-4E9A-ADE9-11F898BA6085}" dt="2021-08-15T21:45:10.854" v="0"/>
-            <ac:spMkLst>
-              <pc:docMk/>
-              <pc:sldMasterMk cId="3777914966" sldId="2147483648"/>
-              <pc:sldLayoutMk cId="3884811684" sldId="2147483652"/>
-              <ac:spMk id="4" creationId="{3B21657F-1B1D-4D2B-9E9A-33489F3643A0}"/>
-            </ac:spMkLst>
-          </pc:spChg>
-        </pc:sldLayoutChg>
-        <pc:sldLayoutChg chg="modSp">
-          <pc:chgData name="Peter McGinty" userId="138e04b35f3df159" providerId="LiveId" clId="{58769E37-A9B1-4E9A-ADE9-11F898BA6085}" dt="2021-08-15T21:45:10.854" v="0"/>
-          <pc:sldLayoutMkLst>
-            <pc:docMk/>
-            <pc:sldMasterMk cId="3777914966" sldId="2147483648"/>
-            <pc:sldLayoutMk cId="3564373246" sldId="2147483653"/>
-          </pc:sldLayoutMkLst>
-          <pc:spChg chg="mod">
-            <ac:chgData name="Peter McGinty" userId="138e04b35f3df159" providerId="LiveId" clId="{58769E37-A9B1-4E9A-ADE9-11F898BA6085}" dt="2021-08-15T21:45:10.854" v="0"/>
-            <ac:spMkLst>
-              <pc:docMk/>
-              <pc:sldMasterMk cId="3777914966" sldId="2147483648"/>
-              <pc:sldLayoutMk cId="3564373246" sldId="2147483653"/>
-              <ac:spMk id="2" creationId="{2F1D1480-03BD-43EC-8B64-EE418001FBC7}"/>
-            </ac:spMkLst>
-          </pc:spChg>
-          <pc:spChg chg="mod">
-            <ac:chgData name="Peter McGinty" userId="138e04b35f3df159" providerId="LiveId" clId="{58769E37-A9B1-4E9A-ADE9-11F898BA6085}" dt="2021-08-15T21:45:10.854" v="0"/>
-            <ac:spMkLst>
-              <pc:docMk/>
-              <pc:sldMasterMk cId="3777914966" sldId="2147483648"/>
-              <pc:sldLayoutMk cId="3564373246" sldId="2147483653"/>
-              <ac:spMk id="3" creationId="{E922B0BC-31F9-4657-A4E7-5E56D7CCABF1}"/>
-            </ac:spMkLst>
-          </pc:spChg>
-          <pc:spChg chg="mod">
-            <ac:chgData name="Peter McGinty" userId="138e04b35f3df159" providerId="LiveId" clId="{58769E37-A9B1-4E9A-ADE9-11F898BA6085}" dt="2021-08-15T21:45:10.854" v="0"/>
-            <ac:spMkLst>
-              <pc:docMk/>
-              <pc:sldMasterMk cId="3777914966" sldId="2147483648"/>
-              <pc:sldLayoutMk cId="3564373246" sldId="2147483653"/>
-              <ac:spMk id="4" creationId="{8D09D925-AB1B-49B2-9430-4DB4FBA60847}"/>
-            </ac:spMkLst>
-          </pc:spChg>
-          <pc:spChg chg="mod">
-            <ac:chgData name="Peter McGinty" userId="138e04b35f3df159" providerId="LiveId" clId="{58769E37-A9B1-4E9A-ADE9-11F898BA6085}" dt="2021-08-15T21:45:10.854" v="0"/>
-            <ac:spMkLst>
-              <pc:docMk/>
-              <pc:sldMasterMk cId="3777914966" sldId="2147483648"/>
-              <pc:sldLayoutMk cId="3564373246" sldId="2147483653"/>
-              <ac:spMk id="5" creationId="{14D4FCAA-4914-4E89-9833-37D30C156F33}"/>
-            </ac:spMkLst>
-          </pc:spChg>
-          <pc:spChg chg="mod">
-            <ac:chgData name="Peter McGinty" userId="138e04b35f3df159" providerId="LiveId" clId="{58769E37-A9B1-4E9A-ADE9-11F898BA6085}" dt="2021-08-15T21:45:10.854" v="0"/>
-            <ac:spMkLst>
-              <pc:docMk/>
-              <pc:sldMasterMk cId="3777914966" sldId="2147483648"/>
-              <pc:sldLayoutMk cId="3564373246" sldId="2147483653"/>
-              <ac:spMk id="6" creationId="{54480C19-9120-42D8-BCED-E64FE52E33D6}"/>
-            </ac:spMkLst>
-          </pc:spChg>
-        </pc:sldLayoutChg>
-        <pc:sldLayoutChg chg="modSp">
-          <pc:chgData name="Peter McGinty" userId="138e04b35f3df159" providerId="LiveId" clId="{58769E37-A9B1-4E9A-ADE9-11F898BA6085}" dt="2021-08-15T21:45:10.854" v="0"/>
-          <pc:sldLayoutMkLst>
-            <pc:docMk/>
-            <pc:sldMasterMk cId="3777914966" sldId="2147483648"/>
-            <pc:sldLayoutMk cId="2843147243" sldId="2147483656"/>
-          </pc:sldLayoutMkLst>
-          <pc:spChg chg="mod">
-            <ac:chgData name="Peter McGinty" userId="138e04b35f3df159" providerId="LiveId" clId="{58769E37-A9B1-4E9A-ADE9-11F898BA6085}" dt="2021-08-15T21:45:10.854" v="0"/>
-            <ac:spMkLst>
-              <pc:docMk/>
-              <pc:sldMasterMk cId="3777914966" sldId="2147483648"/>
-              <pc:sldLayoutMk cId="2843147243" sldId="2147483656"/>
-              <ac:spMk id="2" creationId="{5EF0414A-FD1E-41ED-8843-0750D86707C1}"/>
-            </ac:spMkLst>
-          </pc:spChg>
-          <pc:spChg chg="mod">
-            <ac:chgData name="Peter McGinty" userId="138e04b35f3df159" providerId="LiveId" clId="{58769E37-A9B1-4E9A-ADE9-11F898BA6085}" dt="2021-08-15T21:45:10.854" v="0"/>
-            <ac:spMkLst>
-              <pc:docMk/>
-              <pc:sldMasterMk cId="3777914966" sldId="2147483648"/>
-              <pc:sldLayoutMk cId="2843147243" sldId="2147483656"/>
-              <ac:spMk id="3" creationId="{1976D95A-C837-4B7A-B46C-0FA8D5A03719}"/>
-            </ac:spMkLst>
-          </pc:spChg>
-          <pc:spChg chg="mod">
-            <ac:chgData name="Peter McGinty" userId="138e04b35f3df159" providerId="LiveId" clId="{58769E37-A9B1-4E9A-ADE9-11F898BA6085}" dt="2021-08-15T21:45:10.854" v="0"/>
-            <ac:spMkLst>
-              <pc:docMk/>
-              <pc:sldMasterMk cId="3777914966" sldId="2147483648"/>
-              <pc:sldLayoutMk cId="2843147243" sldId="2147483656"/>
-              <ac:spMk id="4" creationId="{85A5544A-18A5-4E64-9EE2-0A75164C4C00}"/>
-            </ac:spMkLst>
-          </pc:spChg>
-        </pc:sldLayoutChg>
-        <pc:sldLayoutChg chg="modSp">
-          <pc:chgData name="Peter McGinty" userId="138e04b35f3df159" providerId="LiveId" clId="{58769E37-A9B1-4E9A-ADE9-11F898BA6085}" dt="2021-08-15T21:45:10.854" v="0"/>
-          <pc:sldLayoutMkLst>
-            <pc:docMk/>
-            <pc:sldMasterMk cId="3777914966" sldId="2147483648"/>
-            <pc:sldLayoutMk cId="2486252067" sldId="2147483657"/>
-          </pc:sldLayoutMkLst>
-          <pc:spChg chg="mod">
-            <ac:chgData name="Peter McGinty" userId="138e04b35f3df159" providerId="LiveId" clId="{58769E37-A9B1-4E9A-ADE9-11F898BA6085}" dt="2021-08-15T21:45:10.854" v="0"/>
-            <ac:spMkLst>
-              <pc:docMk/>
-              <pc:sldMasterMk cId="3777914966" sldId="2147483648"/>
-              <pc:sldLayoutMk cId="2486252067" sldId="2147483657"/>
-              <ac:spMk id="2" creationId="{C44A4DEE-E297-4119-B407-835F89F6EFD9}"/>
-            </ac:spMkLst>
-          </pc:spChg>
-          <pc:spChg chg="mod">
-            <ac:chgData name="Peter McGinty" userId="138e04b35f3df159" providerId="LiveId" clId="{58769E37-A9B1-4E9A-ADE9-11F898BA6085}" dt="2021-08-15T21:45:10.854" v="0"/>
-            <ac:spMkLst>
-              <pc:docMk/>
-              <pc:sldMasterMk cId="3777914966" sldId="2147483648"/>
-              <pc:sldLayoutMk cId="2486252067" sldId="2147483657"/>
-              <ac:spMk id="3" creationId="{6AF88D61-23F0-41F1-BB08-F1574EED8FEE}"/>
-            </ac:spMkLst>
-          </pc:spChg>
-          <pc:spChg chg="mod">
-            <ac:chgData name="Peter McGinty" userId="138e04b35f3df159" providerId="LiveId" clId="{58769E37-A9B1-4E9A-ADE9-11F898BA6085}" dt="2021-08-15T21:45:10.854" v="0"/>
-            <ac:spMkLst>
-              <pc:docMk/>
-              <pc:sldMasterMk cId="3777914966" sldId="2147483648"/>
-              <pc:sldLayoutMk cId="2486252067" sldId="2147483657"/>
-              <ac:spMk id="4" creationId="{E5C49FCD-77CC-46B8-90BA-91815084A522}"/>
-            </ac:spMkLst>
-          </pc:spChg>
-        </pc:sldLayoutChg>
-        <pc:sldLayoutChg chg="modSp">
-          <pc:chgData name="Peter McGinty" userId="138e04b35f3df159" providerId="LiveId" clId="{58769E37-A9B1-4E9A-ADE9-11F898BA6085}" dt="2021-08-15T21:45:10.854" v="0"/>
-          <pc:sldLayoutMkLst>
-            <pc:docMk/>
-            <pc:sldMasterMk cId="3777914966" sldId="2147483648"/>
-            <pc:sldLayoutMk cId="2997959970" sldId="2147483659"/>
-          </pc:sldLayoutMkLst>
-          <pc:spChg chg="mod">
-            <ac:chgData name="Peter McGinty" userId="138e04b35f3df159" providerId="LiveId" clId="{58769E37-A9B1-4E9A-ADE9-11F898BA6085}" dt="2021-08-15T21:45:10.854" v="0"/>
-            <ac:spMkLst>
-              <pc:docMk/>
-              <pc:sldMasterMk cId="3777914966" sldId="2147483648"/>
-              <pc:sldLayoutMk cId="2997959970" sldId="2147483659"/>
-              <ac:spMk id="2" creationId="{5D53BF31-DEE0-479B-BCE8-1DB62A611034}"/>
-            </ac:spMkLst>
-          </pc:spChg>
-          <pc:spChg chg="mod">
-            <ac:chgData name="Peter McGinty" userId="138e04b35f3df159" providerId="LiveId" clId="{58769E37-A9B1-4E9A-ADE9-11F898BA6085}" dt="2021-08-15T21:45:10.854" v="0"/>
-            <ac:spMkLst>
-              <pc:docMk/>
-              <pc:sldMasterMk cId="3777914966" sldId="2147483648"/>
-              <pc:sldLayoutMk cId="2997959970" sldId="2147483659"/>
-              <ac:spMk id="3" creationId="{B223A274-60B8-4E5E-AA71-A5CC4E49BBFB}"/>
-            </ac:spMkLst>
-          </pc:spChg>
-        </pc:sldLayoutChg>
-      </pc:sldMasterChg>
-    </pc:docChg>
-  </pc:docChgLst>
 </pc:chgInfo>
 </file>
 
@@ -5989,7 +6019,7 @@
         </p:nvSpPr>
         <p:spPr>
           <a:xfrm>
-            <a:off x="0" y="0"/>
+            <a:off x="0" y="1"/>
             <a:ext cx="3962400" cy="344091"/>
           </a:xfrm>
           <a:prstGeom prst="rect">
@@ -6020,7 +6050,7 @@
         </p:nvSpPr>
         <p:spPr>
           <a:xfrm>
-            <a:off x="5179484" y="0"/>
+            <a:off x="5179484" y="1"/>
             <a:ext cx="3962400" cy="344091"/>
           </a:xfrm>
           <a:prstGeom prst="rect">
@@ -6037,7 +6067,7 @@
           <a:p>
             <a:fld id="{1EBD4E1B-2196-4B1C-A7F6-845369997D7F}" type="datetimeFigureOut">
               <a:rPr lang="en-GB" smtClean="0"/>
-              <a:t>27/09/2021</a:t>
+              <a:t>02/06/2022</a:t>
             </a:fld>
             <a:endParaRPr lang="en-GB"/>
           </a:p>
@@ -6724,7 +6754,7 @@
           <a:p>
             <a:fld id="{F99AA81C-2B60-42C3-A748-75EA2F3942BF}" type="datetime1">
               <a:rPr lang="en-GB" smtClean="0"/>
-              <a:t>27/09/2021</a:t>
+              <a:t>02/06/2022</a:t>
             </a:fld>
             <a:endParaRPr lang="en-GB"/>
           </a:p>
@@ -6894,7 +6924,7 @@
           <a:p>
             <a:fld id="{16E8729C-0306-4878-A3D6-09398341D606}" type="datetime1">
               <a:rPr lang="en-GB" smtClean="0"/>
-              <a:t>27/09/2021</a:t>
+              <a:t>02/06/2022</a:t>
             </a:fld>
             <a:endParaRPr lang="en-GB"/>
           </a:p>
@@ -7074,7 +7104,7 @@
           <a:p>
             <a:fld id="{630A45D9-B9E8-4610-820A-4A59B1E4101F}" type="datetime1">
               <a:rPr lang="en-GB" smtClean="0"/>
-              <a:t>27/09/2021</a:t>
+              <a:t>02/06/2022</a:t>
             </a:fld>
             <a:endParaRPr lang="en-GB"/>
           </a:p>
@@ -7244,7 +7274,7 @@
           <a:p>
             <a:fld id="{24CB1337-94D5-4918-B360-64FFE871DA51}" type="datetime1">
               <a:rPr lang="en-GB" smtClean="0"/>
-              <a:t>27/09/2021</a:t>
+              <a:t>02/06/2022</a:t>
             </a:fld>
             <a:endParaRPr lang="en-GB"/>
           </a:p>
@@ -7490,7 +7520,7 @@
           <a:p>
             <a:fld id="{372644AF-2164-4CF3-9A52-0793DCB20635}" type="datetime1">
               <a:rPr lang="en-GB" smtClean="0"/>
-              <a:t>27/09/2021</a:t>
+              <a:t>02/06/2022</a:t>
             </a:fld>
             <a:endParaRPr lang="en-GB"/>
           </a:p>
@@ -7722,7 +7752,7 @@
           <a:p>
             <a:fld id="{46395A6A-8405-498E-B628-AFCE81617177}" type="datetime1">
               <a:rPr lang="en-GB" smtClean="0"/>
-              <a:t>27/09/2021</a:t>
+              <a:t>02/06/2022</a:t>
             </a:fld>
             <a:endParaRPr lang="en-GB"/>
           </a:p>
@@ -8089,7 +8119,7 @@
           <a:p>
             <a:fld id="{E909B44D-3270-40B8-ACD2-12507109F736}" type="datetime1">
               <a:rPr lang="en-GB" smtClean="0"/>
-              <a:t>27/09/2021</a:t>
+              <a:t>02/06/2022</a:t>
             </a:fld>
             <a:endParaRPr lang="en-GB"/>
           </a:p>
@@ -8207,7 +8237,7 @@
           <a:p>
             <a:fld id="{5EA02067-C42E-4109-B65A-12D269CA97C5}" type="datetime1">
               <a:rPr lang="en-GB" smtClean="0"/>
-              <a:t>27/09/2021</a:t>
+              <a:t>02/06/2022</a:t>
             </a:fld>
             <a:endParaRPr lang="en-GB"/>
           </a:p>
@@ -8302,7 +8332,7 @@
           <a:p>
             <a:fld id="{94365B42-69A9-4109-8C35-ED4BC0890372}" type="datetime1">
               <a:rPr lang="en-GB" smtClean="0"/>
-              <a:t>27/09/2021</a:t>
+              <a:t>02/06/2022</a:t>
             </a:fld>
             <a:endParaRPr lang="en-GB"/>
           </a:p>
@@ -8579,7 +8609,7 @@
           <a:p>
             <a:fld id="{53D4B12E-8E86-41FF-A319-015531BB30C2}" type="datetime1">
               <a:rPr lang="en-GB" smtClean="0"/>
-              <a:t>27/09/2021</a:t>
+              <a:t>02/06/2022</a:t>
             </a:fld>
             <a:endParaRPr lang="en-GB"/>
           </a:p>
@@ -8836,7 +8866,7 @@
           <a:p>
             <a:fld id="{842C57B0-CF72-4766-AD5B-C54D18F943AA}" type="datetime1">
               <a:rPr lang="en-GB" smtClean="0"/>
-              <a:t>27/09/2021</a:t>
+              <a:t>02/06/2022</a:t>
             </a:fld>
             <a:endParaRPr lang="en-GB"/>
           </a:p>
@@ -9049,7 +9079,7 @@
           <a:p>
             <a:fld id="{0A82B6E7-1570-42A0-95C4-43A22D9DAFEC}" type="datetime1">
               <a:rPr lang="en-GB" smtClean="0"/>
-              <a:t>27/09/2021</a:t>
+              <a:t>02/06/2022</a:t>
             </a:fld>
             <a:endParaRPr lang="en-GB"/>
           </a:p>

</xml_diff>